<commit_message>
Update Multithreading and Synchronization.pptx
</commit_message>
<xml_diff>
--- a/9 - Multithreading and Synchronization/Multithreading and Synchronization.pptx
+++ b/9 - Multithreading and Synchronization/Multithreading and Synchronization.pptx
@@ -5,7 +5,7 @@
     <p:sldMasterId id="2147483648" r:id="rId1"/>
   </p:sldMasterIdLst>
   <p:notesMasterIdLst>
-    <p:notesMasterId r:id="rId23"/>
+    <p:notesMasterId r:id="rId24"/>
   </p:notesMasterIdLst>
   <p:sldIdLst>
     <p:sldId id="257" r:id="rId2"/>
@@ -14,21 +14,22 @@
     <p:sldId id="437" r:id="rId5"/>
     <p:sldId id="397" r:id="rId6"/>
     <p:sldId id="398" r:id="rId7"/>
-    <p:sldId id="439" r:id="rId8"/>
-    <p:sldId id="440" r:id="rId9"/>
-    <p:sldId id="442" r:id="rId10"/>
-    <p:sldId id="443" r:id="rId11"/>
-    <p:sldId id="449" r:id="rId12"/>
-    <p:sldId id="444" r:id="rId13"/>
-    <p:sldId id="445" r:id="rId14"/>
-    <p:sldId id="446" r:id="rId15"/>
-    <p:sldId id="447" r:id="rId16"/>
-    <p:sldId id="448" r:id="rId17"/>
-    <p:sldId id="450" r:id="rId18"/>
-    <p:sldId id="451" r:id="rId19"/>
-    <p:sldId id="453" r:id="rId20"/>
-    <p:sldId id="454" r:id="rId21"/>
-    <p:sldId id="455" r:id="rId22"/>
+    <p:sldId id="456" r:id="rId8"/>
+    <p:sldId id="439" r:id="rId9"/>
+    <p:sldId id="440" r:id="rId10"/>
+    <p:sldId id="442" r:id="rId11"/>
+    <p:sldId id="443" r:id="rId12"/>
+    <p:sldId id="449" r:id="rId13"/>
+    <p:sldId id="444" r:id="rId14"/>
+    <p:sldId id="445" r:id="rId15"/>
+    <p:sldId id="446" r:id="rId16"/>
+    <p:sldId id="447" r:id="rId17"/>
+    <p:sldId id="448" r:id="rId18"/>
+    <p:sldId id="450" r:id="rId19"/>
+    <p:sldId id="451" r:id="rId20"/>
+    <p:sldId id="453" r:id="rId21"/>
+    <p:sldId id="454" r:id="rId22"/>
+    <p:sldId id="455" r:id="rId23"/>
   </p:sldIdLst>
   <p:sldSz cx="12192000" cy="6858000"/>
   <p:notesSz cx="6858000" cy="9144000"/>
@@ -3576,7 +3577,7 @@
           <a:p>
             <a:fld id="{75A99358-0554-3345-871D-48A6BABEE3E1}" type="datetimeFigureOut">
               <a:rPr lang="en-US" smtClean="0"/>
-              <a:t>6/2/2025</a:t>
+              <a:t>6/2/25</a:t>
             </a:fld>
             <a:endParaRPr lang="en-US"/>
           </a:p>
@@ -4019,7 +4020,7 @@
           <a:p>
             <a:fld id="{04BC266F-70C8-954B-9EC8-D842168CE9D2}" type="datetimeFigureOut">
               <a:rPr lang="en-US" smtClean="0"/>
-              <a:t>6/2/2025</a:t>
+              <a:t>6/2/25</a:t>
             </a:fld>
             <a:endParaRPr lang="en-US"/>
           </a:p>
@@ -5969,7 +5970,7 @@
           <a:p>
             <a:fld id="{04BC266F-70C8-954B-9EC8-D842168CE9D2}" type="datetimeFigureOut">
               <a:rPr lang="en-US" smtClean="0"/>
-              <a:t>6/2/2025</a:t>
+              <a:t>6/2/25</a:t>
             </a:fld>
             <a:endParaRPr lang="en-US"/>
           </a:p>
@@ -7627,7 +7628,7 @@
           <a:p>
             <a:fld id="{04BC266F-70C8-954B-9EC8-D842168CE9D2}" type="datetimeFigureOut">
               <a:rPr lang="en-US" smtClean="0"/>
-              <a:t>6/2/2025</a:t>
+              <a:t>6/2/25</a:t>
             </a:fld>
             <a:endParaRPr lang="en-US"/>
           </a:p>
@@ -8072,7 +8073,7 @@
           <a:p>
             <a:fld id="{04BC266F-70C8-954B-9EC8-D842168CE9D2}" type="datetimeFigureOut">
               <a:rPr lang="en-US" smtClean="0"/>
-              <a:t>6/2/2025</a:t>
+              <a:t>6/2/25</a:t>
             </a:fld>
             <a:endParaRPr lang="en-US"/>
           </a:p>
@@ -9742,7 +9743,7 @@
           <a:p>
             <a:fld id="{04BC266F-70C8-954B-9EC8-D842168CE9D2}" type="datetimeFigureOut">
               <a:rPr lang="en-US" smtClean="0"/>
-              <a:t>6/2/2025</a:t>
+              <a:t>6/2/25</a:t>
             </a:fld>
             <a:endParaRPr lang="en-US"/>
           </a:p>
@@ -10250,6 +10251,1169 @@
   <p:cSld>
     <p:spTree>
       <p:nvGrpSpPr>
+        <p:cNvPr id="1" name=""/>
+        <p:cNvGrpSpPr/>
+        <p:nvPr/>
+      </p:nvGrpSpPr>
+      <p:grpSpPr>
+        <a:xfrm>
+          <a:off x="0" y="0"/>
+          <a:ext cx="0" cy="0"/>
+          <a:chOff x="0" y="0"/>
+          <a:chExt cx="0" cy="0"/>
+        </a:xfrm>
+      </p:grpSpPr>
+      <p:sp>
+        <p:nvSpPr>
+          <p:cNvPr id="2" name="Title 1">
+            <a:extLst>
+              <a:ext uri="{FF2B5EF4-FFF2-40B4-BE49-F238E27FC236}">
+                <a16:creationId xmlns:a16="http://schemas.microsoft.com/office/drawing/2014/main" id="{4D4C379C-2D30-02FF-A63C-8FDC0BA4F39E}"/>
+              </a:ext>
+            </a:extLst>
+          </p:cNvPr>
+          <p:cNvSpPr>
+            <a:spLocks noGrp="1"/>
+          </p:cNvSpPr>
+          <p:nvPr>
+            <p:ph type="title"/>
+          </p:nvPr>
+        </p:nvSpPr>
+        <p:spPr/>
+        <p:txBody>
+          <a:bodyPr/>
+          <a:lstStyle/>
+          <a:p>
+            <a:r>
+              <a:rPr lang="en-PH" dirty="0"/>
+              <a:t>Creating a Thread</a:t>
+            </a:r>
+          </a:p>
+        </p:txBody>
+      </p:sp>
+      <p:grpSp>
+        <p:nvGrpSpPr>
+          <p:cNvPr id="4" name="Group 3">
+            <a:extLst>
+              <a:ext uri="{FF2B5EF4-FFF2-40B4-BE49-F238E27FC236}">
+                <a16:creationId xmlns:a16="http://schemas.microsoft.com/office/drawing/2014/main" id="{41847312-5381-CEFF-68DE-DDC94E950628}"/>
+              </a:ext>
+            </a:extLst>
+          </p:cNvPr>
+          <p:cNvGrpSpPr/>
+          <p:nvPr/>
+        </p:nvGrpSpPr>
+        <p:grpSpPr>
+          <a:xfrm>
+            <a:off x="10001402" y="1969851"/>
+            <a:ext cx="1712230" cy="369332"/>
+            <a:chOff x="9913262" y="1679539"/>
+            <a:chExt cx="1712230" cy="369332"/>
+          </a:xfrm>
+        </p:grpSpPr>
+        <p:pic>
+          <p:nvPicPr>
+            <p:cNvPr id="5" name="Picture 4" descr="A paper with a logo on it&#10;&#10;AI-generated content may be incorrect.">
+              <a:extLst>
+                <a:ext uri="{FF2B5EF4-FFF2-40B4-BE49-F238E27FC236}">
+                  <a16:creationId xmlns:a16="http://schemas.microsoft.com/office/drawing/2014/main" id="{101C3336-D9EE-FAC3-EC55-17D4C0A8918A}"/>
+                </a:ext>
+              </a:extLst>
+            </p:cNvPr>
+            <p:cNvPicPr>
+              <a:picLocks noChangeAspect="1"/>
+            </p:cNvPicPr>
+            <p:nvPr/>
+          </p:nvPicPr>
+          <p:blipFill>
+            <a:blip r:embed="rId2"/>
+            <a:stretch>
+              <a:fillRect/>
+            </a:stretch>
+          </p:blipFill>
+          <p:spPr>
+            <a:xfrm>
+              <a:off x="9913262" y="1679539"/>
+              <a:ext cx="360000" cy="360000"/>
+            </a:xfrm>
+            <a:prstGeom prst="rect">
+              <a:avLst/>
+            </a:prstGeom>
+          </p:spPr>
+        </p:pic>
+        <p:sp>
+          <p:nvSpPr>
+            <p:cNvPr id="6" name="TextBox 5">
+              <a:extLst>
+                <a:ext uri="{FF2B5EF4-FFF2-40B4-BE49-F238E27FC236}">
+                  <a16:creationId xmlns:a16="http://schemas.microsoft.com/office/drawing/2014/main" id="{59DAD33F-EB3D-77DA-4971-62CD2DC2538A}"/>
+                </a:ext>
+              </a:extLst>
+            </p:cNvPr>
+            <p:cNvSpPr txBox="1"/>
+            <p:nvPr/>
+          </p:nvSpPr>
+          <p:spPr>
+            <a:xfrm>
+              <a:off x="10273262" y="1679539"/>
+              <a:ext cx="1352230" cy="369332"/>
+            </a:xfrm>
+            <a:prstGeom prst="rect">
+              <a:avLst/>
+            </a:prstGeom>
+            <a:noFill/>
+          </p:spPr>
+          <p:txBody>
+            <a:bodyPr wrap="none" rtlCol="0">
+              <a:spAutoFit/>
+            </a:bodyPr>
+            <a:lstStyle/>
+            <a:p>
+              <a:r>
+                <a:rPr lang="en-PH" dirty="0">
+                  <a:solidFill>
+                    <a:schemeClr val="bg1"/>
+                  </a:solidFill>
+                </a:rPr>
+                <a:t>Animal.java</a:t>
+              </a:r>
+            </a:p>
+          </p:txBody>
+        </p:sp>
+      </p:grpSp>
+      <p:sp>
+        <p:nvSpPr>
+          <p:cNvPr id="7" name="Content Placeholder 2">
+            <a:extLst>
+              <a:ext uri="{FF2B5EF4-FFF2-40B4-BE49-F238E27FC236}">
+                <a16:creationId xmlns:a16="http://schemas.microsoft.com/office/drawing/2014/main" id="{945577EA-1D1A-72BE-24F9-5A23EEC2C9BF}"/>
+              </a:ext>
+            </a:extLst>
+          </p:cNvPr>
+          <p:cNvSpPr txBox="1">
+            <a:spLocks/>
+          </p:cNvSpPr>
+          <p:nvPr/>
+        </p:nvSpPr>
+        <p:spPr>
+          <a:xfrm>
+            <a:off x="606114" y="1949823"/>
+            <a:ext cx="11235266" cy="3173505"/>
+          </a:xfrm>
+          <a:prstGeom prst="rect">
+            <a:avLst/>
+          </a:prstGeom>
+          <a:solidFill>
+            <a:schemeClr val="tx1"/>
+          </a:solidFill>
+        </p:spPr>
+        <p:txBody>
+          <a:bodyPr vert="horz" lIns="91440" tIns="45720" rIns="91440" bIns="45720" rtlCol="0">
+            <a:normAutofit/>
+          </a:bodyPr>
+          <a:lstStyle>
+            <a:lvl1pPr marL="0" indent="0" algn="ctr" defTabSz="914400" rtl="0" eaLnBrk="1" latinLnBrk="0" hangingPunct="1">
+              <a:lnSpc>
+                <a:spcPct val="90000"/>
+              </a:lnSpc>
+              <a:spcBef>
+                <a:spcPts val="1000"/>
+              </a:spcBef>
+              <a:buFont typeface="Arial" panose="020B0604020202020204" pitchFamily="34" charset="0"/>
+              <a:buNone/>
+              <a:defRPr sz="2400" kern="1200">
+                <a:solidFill>
+                  <a:schemeClr val="tx1"/>
+                </a:solidFill>
+                <a:latin typeface="+mn-lt"/>
+                <a:ea typeface="+mn-ea"/>
+                <a:cs typeface="+mn-cs"/>
+              </a:defRPr>
+            </a:lvl1pPr>
+            <a:lvl2pPr marL="457200" indent="0" algn="ctr" defTabSz="914400" rtl="0" eaLnBrk="1" latinLnBrk="0" hangingPunct="1">
+              <a:lnSpc>
+                <a:spcPct val="90000"/>
+              </a:lnSpc>
+              <a:spcBef>
+                <a:spcPts val="500"/>
+              </a:spcBef>
+              <a:buFont typeface="Arial" panose="020B0604020202020204" pitchFamily="34" charset="0"/>
+              <a:buNone/>
+              <a:defRPr sz="2000" kern="1200">
+                <a:solidFill>
+                  <a:schemeClr val="tx1"/>
+                </a:solidFill>
+                <a:latin typeface="+mn-lt"/>
+                <a:ea typeface="+mn-ea"/>
+                <a:cs typeface="+mn-cs"/>
+              </a:defRPr>
+            </a:lvl2pPr>
+            <a:lvl3pPr marL="914400" indent="0" algn="ctr" defTabSz="914400" rtl="0" eaLnBrk="1" latinLnBrk="0" hangingPunct="1">
+              <a:lnSpc>
+                <a:spcPct val="90000"/>
+              </a:lnSpc>
+              <a:spcBef>
+                <a:spcPts val="500"/>
+              </a:spcBef>
+              <a:buFont typeface="Arial" panose="020B0604020202020204" pitchFamily="34" charset="0"/>
+              <a:buNone/>
+              <a:defRPr sz="1800" kern="1200">
+                <a:solidFill>
+                  <a:schemeClr val="tx1"/>
+                </a:solidFill>
+                <a:latin typeface="+mn-lt"/>
+                <a:ea typeface="+mn-ea"/>
+                <a:cs typeface="+mn-cs"/>
+              </a:defRPr>
+            </a:lvl3pPr>
+            <a:lvl4pPr marL="1371600" indent="0" algn="ctr" defTabSz="914400" rtl="0" eaLnBrk="1" latinLnBrk="0" hangingPunct="1">
+              <a:lnSpc>
+                <a:spcPct val="90000"/>
+              </a:lnSpc>
+              <a:spcBef>
+                <a:spcPts val="500"/>
+              </a:spcBef>
+              <a:buFont typeface="Arial" panose="020B0604020202020204" pitchFamily="34" charset="0"/>
+              <a:buNone/>
+              <a:defRPr sz="1600" kern="1200">
+                <a:solidFill>
+                  <a:schemeClr val="tx1"/>
+                </a:solidFill>
+                <a:latin typeface="+mn-lt"/>
+                <a:ea typeface="+mn-ea"/>
+                <a:cs typeface="+mn-cs"/>
+              </a:defRPr>
+            </a:lvl4pPr>
+            <a:lvl5pPr marL="1828800" indent="0" algn="ctr" defTabSz="914400" rtl="0" eaLnBrk="1" latinLnBrk="0" hangingPunct="1">
+              <a:lnSpc>
+                <a:spcPct val="90000"/>
+              </a:lnSpc>
+              <a:spcBef>
+                <a:spcPts val="500"/>
+              </a:spcBef>
+              <a:buFont typeface="Arial" panose="020B0604020202020204" pitchFamily="34" charset="0"/>
+              <a:buNone/>
+              <a:defRPr sz="1600" kern="1200">
+                <a:solidFill>
+                  <a:schemeClr val="tx1"/>
+                </a:solidFill>
+                <a:latin typeface="+mn-lt"/>
+                <a:ea typeface="+mn-ea"/>
+                <a:cs typeface="+mn-cs"/>
+              </a:defRPr>
+            </a:lvl5pPr>
+            <a:lvl6pPr marL="2286000" indent="0" algn="ctr" defTabSz="914400" rtl="0" eaLnBrk="1" latinLnBrk="0" hangingPunct="1">
+              <a:lnSpc>
+                <a:spcPct val="90000"/>
+              </a:lnSpc>
+              <a:spcBef>
+                <a:spcPts val="500"/>
+              </a:spcBef>
+              <a:buFont typeface="Arial" panose="020B0604020202020204" pitchFamily="34" charset="0"/>
+              <a:buNone/>
+              <a:defRPr sz="1600" kern="1200">
+                <a:solidFill>
+                  <a:schemeClr val="tx1"/>
+                </a:solidFill>
+                <a:latin typeface="+mn-lt"/>
+                <a:ea typeface="+mn-ea"/>
+                <a:cs typeface="+mn-cs"/>
+              </a:defRPr>
+            </a:lvl6pPr>
+            <a:lvl7pPr marL="2743200" indent="0" algn="ctr" defTabSz="914400" rtl="0" eaLnBrk="1" latinLnBrk="0" hangingPunct="1">
+              <a:lnSpc>
+                <a:spcPct val="90000"/>
+              </a:lnSpc>
+              <a:spcBef>
+                <a:spcPts val="500"/>
+              </a:spcBef>
+              <a:buFont typeface="Arial" panose="020B0604020202020204" pitchFamily="34" charset="0"/>
+              <a:buNone/>
+              <a:defRPr sz="1600" kern="1200">
+                <a:solidFill>
+                  <a:schemeClr val="tx1"/>
+                </a:solidFill>
+                <a:latin typeface="+mn-lt"/>
+                <a:ea typeface="+mn-ea"/>
+                <a:cs typeface="+mn-cs"/>
+              </a:defRPr>
+            </a:lvl7pPr>
+            <a:lvl8pPr marL="3200400" indent="0" algn="ctr" defTabSz="914400" rtl="0" eaLnBrk="1" latinLnBrk="0" hangingPunct="1">
+              <a:lnSpc>
+                <a:spcPct val="90000"/>
+              </a:lnSpc>
+              <a:spcBef>
+                <a:spcPts val="500"/>
+              </a:spcBef>
+              <a:buFont typeface="Arial" panose="020B0604020202020204" pitchFamily="34" charset="0"/>
+              <a:buNone/>
+              <a:defRPr sz="1600" kern="1200">
+                <a:solidFill>
+                  <a:schemeClr val="tx1"/>
+                </a:solidFill>
+                <a:latin typeface="+mn-lt"/>
+                <a:ea typeface="+mn-ea"/>
+                <a:cs typeface="+mn-cs"/>
+              </a:defRPr>
+            </a:lvl8pPr>
+            <a:lvl9pPr marL="3657600" indent="0" algn="ctr" defTabSz="914400" rtl="0" eaLnBrk="1" latinLnBrk="0" hangingPunct="1">
+              <a:lnSpc>
+                <a:spcPct val="90000"/>
+              </a:lnSpc>
+              <a:spcBef>
+                <a:spcPts val="500"/>
+              </a:spcBef>
+              <a:buFont typeface="Arial" panose="020B0604020202020204" pitchFamily="34" charset="0"/>
+              <a:buNone/>
+              <a:defRPr sz="1600" kern="1200">
+                <a:solidFill>
+                  <a:schemeClr val="tx1"/>
+                </a:solidFill>
+                <a:latin typeface="+mn-lt"/>
+                <a:ea typeface="+mn-ea"/>
+                <a:cs typeface="+mn-cs"/>
+              </a:defRPr>
+            </a:lvl9pPr>
+          </a:lstStyle>
+          <a:p>
+            <a:pPr>
+              <a:buFont typeface="Wingdings" panose="05000000000000000000" pitchFamily="2" charset="2"/>
+              <a:buChar char="§"/>
+            </a:pPr>
+            <a:endParaRPr lang="en-PH" dirty="0">
+              <a:solidFill>
+                <a:schemeClr val="bg1"/>
+              </a:solidFill>
+              <a:latin typeface="Aptos (Body)"/>
+            </a:endParaRPr>
+          </a:p>
+        </p:txBody>
+      </p:sp>
+      <p:sp>
+        <p:nvSpPr>
+          <p:cNvPr id="8" name="TextBox 7">
+            <a:extLst>
+              <a:ext uri="{FF2B5EF4-FFF2-40B4-BE49-F238E27FC236}">
+                <a16:creationId xmlns:a16="http://schemas.microsoft.com/office/drawing/2014/main" id="{91ED0E3C-FDD2-C790-987B-2C0EB5D427C3}"/>
+              </a:ext>
+            </a:extLst>
+          </p:cNvPr>
+          <p:cNvSpPr txBox="1"/>
+          <p:nvPr/>
+        </p:nvSpPr>
+        <p:spPr>
+          <a:xfrm>
+            <a:off x="870769" y="2269144"/>
+            <a:ext cx="10842863" cy="2755178"/>
+          </a:xfrm>
+          <a:prstGeom prst="rect">
+            <a:avLst/>
+          </a:prstGeom>
+          <a:noFill/>
+        </p:spPr>
+        <p:txBody>
+          <a:bodyPr wrap="square">
+            <a:spAutoFit/>
+          </a:bodyPr>
+          <a:lstStyle/>
+          <a:p>
+            <a:pPr>
+              <a:buNone/>
+            </a:pPr>
+            <a:r>
+              <a:rPr lang="en-US" sz="2000" b="0" dirty="0">
+                <a:solidFill>
+                  <a:srgbClr val="569CD6"/>
+                </a:solidFill>
+                <a:effectLst/>
+                <a:latin typeface="Consolas" panose="020B0609020204030204" pitchFamily="49" charset="0"/>
+              </a:rPr>
+              <a:t>public</a:t>
+            </a:r>
+            <a:r>
+              <a:rPr lang="en-US" sz="2000" b="0" dirty="0">
+                <a:solidFill>
+                  <a:srgbClr val="CCCCCC"/>
+                </a:solidFill>
+                <a:effectLst/>
+                <a:latin typeface="Consolas" panose="020B0609020204030204" pitchFamily="49" charset="0"/>
+              </a:rPr>
+              <a:t> </a:t>
+            </a:r>
+            <a:r>
+              <a:rPr lang="en-US" sz="2000" b="0" dirty="0">
+                <a:solidFill>
+                  <a:srgbClr val="569CD6"/>
+                </a:solidFill>
+                <a:effectLst/>
+                <a:latin typeface="Consolas" panose="020B0609020204030204" pitchFamily="49" charset="0"/>
+              </a:rPr>
+              <a:t>class</a:t>
+            </a:r>
+            <a:r>
+              <a:rPr lang="en-US" sz="2000" b="0" dirty="0">
+                <a:solidFill>
+                  <a:srgbClr val="CCCCCC"/>
+                </a:solidFill>
+                <a:effectLst/>
+                <a:latin typeface="Consolas" panose="020B0609020204030204" pitchFamily="49" charset="0"/>
+              </a:rPr>
+              <a:t> </a:t>
+            </a:r>
+            <a:r>
+              <a:rPr lang="en-US" sz="2000" b="0" dirty="0" err="1">
+                <a:solidFill>
+                  <a:srgbClr val="4EC9B0"/>
+                </a:solidFill>
+                <a:effectLst/>
+                <a:latin typeface="Consolas" panose="020B0609020204030204" pitchFamily="49" charset="0"/>
+              </a:rPr>
+              <a:t>MyThread</a:t>
+            </a:r>
+            <a:r>
+              <a:rPr lang="en-US" sz="2000" b="0" dirty="0">
+                <a:solidFill>
+                  <a:srgbClr val="CCCCCC"/>
+                </a:solidFill>
+                <a:effectLst/>
+                <a:latin typeface="Consolas" panose="020B0609020204030204" pitchFamily="49" charset="0"/>
+              </a:rPr>
+              <a:t> </a:t>
+            </a:r>
+            <a:r>
+              <a:rPr lang="en-US" sz="2000" b="0" dirty="0">
+                <a:solidFill>
+                  <a:srgbClr val="569CD6"/>
+                </a:solidFill>
+                <a:effectLst/>
+                <a:latin typeface="Consolas" panose="020B0609020204030204" pitchFamily="49" charset="0"/>
+              </a:rPr>
+              <a:t>extends</a:t>
+            </a:r>
+            <a:r>
+              <a:rPr lang="en-US" sz="2000" b="0" dirty="0">
+                <a:solidFill>
+                  <a:srgbClr val="CCCCCC"/>
+                </a:solidFill>
+                <a:effectLst/>
+                <a:latin typeface="Consolas" panose="020B0609020204030204" pitchFamily="49" charset="0"/>
+              </a:rPr>
+              <a:t> </a:t>
+            </a:r>
+            <a:r>
+              <a:rPr lang="en-US" sz="2000" b="0" dirty="0">
+                <a:solidFill>
+                  <a:srgbClr val="4EC9B0"/>
+                </a:solidFill>
+                <a:effectLst/>
+                <a:latin typeface="Consolas" panose="020B0609020204030204" pitchFamily="49" charset="0"/>
+              </a:rPr>
+              <a:t>Thread</a:t>
+            </a:r>
+            <a:r>
+              <a:rPr lang="en-US" sz="2000" b="0" dirty="0">
+                <a:solidFill>
+                  <a:srgbClr val="CCCCCC"/>
+                </a:solidFill>
+                <a:effectLst/>
+                <a:latin typeface="Consolas" panose="020B0609020204030204" pitchFamily="49" charset="0"/>
+              </a:rPr>
+              <a:t>{</a:t>
+            </a:r>
+          </a:p>
+          <a:p>
+            <a:pPr>
+              <a:buNone/>
+            </a:pPr>
+            <a:br>
+              <a:rPr lang="en-US" sz="2000" b="0" dirty="0">
+                <a:solidFill>
+                  <a:srgbClr val="CCCCCC"/>
+                </a:solidFill>
+                <a:effectLst/>
+                <a:latin typeface="Consolas" panose="020B0609020204030204" pitchFamily="49" charset="0"/>
+              </a:rPr>
+            </a:br>
+            <a:r>
+              <a:rPr lang="en-US" sz="2000" b="0" dirty="0">
+                <a:solidFill>
+                  <a:srgbClr val="CCCCCC"/>
+                </a:solidFill>
+                <a:effectLst/>
+                <a:latin typeface="Consolas" panose="020B0609020204030204" pitchFamily="49" charset="0"/>
+              </a:rPr>
+              <a:t>    @</a:t>
+            </a:r>
+            <a:r>
+              <a:rPr lang="en-US" sz="2000" b="0" dirty="0">
+                <a:solidFill>
+                  <a:srgbClr val="4EC9B0"/>
+                </a:solidFill>
+                <a:effectLst/>
+                <a:latin typeface="Consolas" panose="020B0609020204030204" pitchFamily="49" charset="0"/>
+              </a:rPr>
+              <a:t>Override</a:t>
+            </a:r>
+            <a:endParaRPr lang="en-US" sz="2000" b="0" dirty="0">
+              <a:solidFill>
+                <a:srgbClr val="CCCCCC"/>
+              </a:solidFill>
+              <a:effectLst/>
+              <a:latin typeface="Consolas" panose="020B0609020204030204" pitchFamily="49" charset="0"/>
+            </a:endParaRPr>
+          </a:p>
+          <a:p>
+            <a:pPr>
+              <a:buNone/>
+            </a:pPr>
+            <a:r>
+              <a:rPr lang="en-US" sz="2000" b="0" dirty="0">
+                <a:solidFill>
+                  <a:srgbClr val="CCCCCC"/>
+                </a:solidFill>
+                <a:effectLst/>
+                <a:latin typeface="Consolas" panose="020B0609020204030204" pitchFamily="49" charset="0"/>
+              </a:rPr>
+              <a:t>    </a:t>
+            </a:r>
+            <a:r>
+              <a:rPr lang="en-US" sz="2000" b="0" dirty="0">
+                <a:solidFill>
+                  <a:srgbClr val="569CD6"/>
+                </a:solidFill>
+                <a:effectLst/>
+                <a:latin typeface="Consolas" panose="020B0609020204030204" pitchFamily="49" charset="0"/>
+              </a:rPr>
+              <a:t>public</a:t>
+            </a:r>
+            <a:r>
+              <a:rPr lang="en-US" sz="2000" b="0" dirty="0">
+                <a:solidFill>
+                  <a:srgbClr val="CCCCCC"/>
+                </a:solidFill>
+                <a:effectLst/>
+                <a:latin typeface="Consolas" panose="020B0609020204030204" pitchFamily="49" charset="0"/>
+              </a:rPr>
+              <a:t> </a:t>
+            </a:r>
+            <a:r>
+              <a:rPr lang="en-US" sz="2000" b="0" dirty="0">
+                <a:solidFill>
+                  <a:srgbClr val="4EC9B0"/>
+                </a:solidFill>
+                <a:effectLst/>
+                <a:latin typeface="Consolas" panose="020B0609020204030204" pitchFamily="49" charset="0"/>
+              </a:rPr>
+              <a:t>void</a:t>
+            </a:r>
+            <a:r>
+              <a:rPr lang="en-US" sz="2000" b="0" dirty="0">
+                <a:solidFill>
+                  <a:srgbClr val="CCCCCC"/>
+                </a:solidFill>
+                <a:effectLst/>
+                <a:latin typeface="Consolas" panose="020B0609020204030204" pitchFamily="49" charset="0"/>
+              </a:rPr>
+              <a:t> </a:t>
+            </a:r>
+            <a:r>
+              <a:rPr lang="en-US" sz="2000" b="0" dirty="0">
+                <a:solidFill>
+                  <a:srgbClr val="DCDCAA"/>
+                </a:solidFill>
+                <a:effectLst/>
+                <a:latin typeface="Consolas" panose="020B0609020204030204" pitchFamily="49" charset="0"/>
+              </a:rPr>
+              <a:t>run</a:t>
+            </a:r>
+            <a:r>
+              <a:rPr lang="en-US" sz="2000" b="0" dirty="0">
+                <a:solidFill>
+                  <a:srgbClr val="CCCCCC"/>
+                </a:solidFill>
+                <a:effectLst/>
+                <a:latin typeface="Consolas" panose="020B0609020204030204" pitchFamily="49" charset="0"/>
+              </a:rPr>
+              <a:t>() {</a:t>
+            </a:r>
+          </a:p>
+          <a:p>
+            <a:pPr>
+              <a:buNone/>
+            </a:pPr>
+            <a:r>
+              <a:rPr lang="en-US" sz="2000" b="0" dirty="0">
+                <a:solidFill>
+                  <a:srgbClr val="CCCCCC"/>
+                </a:solidFill>
+                <a:effectLst/>
+                <a:latin typeface="Consolas" panose="020B0609020204030204" pitchFamily="49" charset="0"/>
+              </a:rPr>
+              <a:t>    </a:t>
+            </a:r>
+          </a:p>
+          <a:p>
+            <a:pPr>
+              <a:buNone/>
+            </a:pPr>
+            <a:r>
+              <a:rPr lang="en-US" sz="2000" b="0" dirty="0">
+                <a:solidFill>
+                  <a:srgbClr val="CCCCCC"/>
+                </a:solidFill>
+                <a:effectLst/>
+                <a:latin typeface="Consolas" panose="020B0609020204030204" pitchFamily="49" charset="0"/>
+              </a:rPr>
+              <a:t>        </a:t>
+            </a:r>
+            <a:r>
+              <a:rPr lang="en-US" sz="2000" b="0" dirty="0" err="1">
+                <a:solidFill>
+                  <a:srgbClr val="4EC9B0"/>
+                </a:solidFill>
+                <a:effectLst/>
+                <a:latin typeface="Consolas" panose="020B0609020204030204" pitchFamily="49" charset="0"/>
+              </a:rPr>
+              <a:t>System</a:t>
+            </a:r>
+            <a:r>
+              <a:rPr lang="en-US" sz="2000" b="0" dirty="0" err="1">
+                <a:solidFill>
+                  <a:srgbClr val="CCCCCC"/>
+                </a:solidFill>
+                <a:effectLst/>
+                <a:latin typeface="Consolas" panose="020B0609020204030204" pitchFamily="49" charset="0"/>
+              </a:rPr>
+              <a:t>.</a:t>
+            </a:r>
+            <a:r>
+              <a:rPr lang="en-US" sz="2000" b="0" dirty="0" err="1">
+                <a:solidFill>
+                  <a:srgbClr val="9CDCFE"/>
+                </a:solidFill>
+                <a:effectLst/>
+                <a:latin typeface="Consolas" panose="020B0609020204030204" pitchFamily="49" charset="0"/>
+              </a:rPr>
+              <a:t>out</a:t>
+            </a:r>
+            <a:r>
+              <a:rPr lang="en-US" sz="2000" b="0" dirty="0" err="1">
+                <a:solidFill>
+                  <a:srgbClr val="CCCCCC"/>
+                </a:solidFill>
+                <a:effectLst/>
+                <a:latin typeface="Consolas" panose="020B0609020204030204" pitchFamily="49" charset="0"/>
+              </a:rPr>
+              <a:t>.</a:t>
+            </a:r>
+            <a:r>
+              <a:rPr lang="en-US" sz="2000" b="0" dirty="0" err="1">
+                <a:solidFill>
+                  <a:srgbClr val="DCDCAA"/>
+                </a:solidFill>
+                <a:effectLst/>
+                <a:latin typeface="Consolas" panose="020B0609020204030204" pitchFamily="49" charset="0"/>
+              </a:rPr>
+              <a:t>println</a:t>
+            </a:r>
+            <a:r>
+              <a:rPr lang="en-US" sz="2000" b="0" dirty="0">
+                <a:solidFill>
+                  <a:srgbClr val="CCCCCC"/>
+                </a:solidFill>
+                <a:effectLst/>
+                <a:latin typeface="Consolas" panose="020B0609020204030204" pitchFamily="49" charset="0"/>
+              </a:rPr>
+              <a:t>(</a:t>
+            </a:r>
+            <a:r>
+              <a:rPr lang="en-US" sz="2000" b="0" dirty="0">
+                <a:solidFill>
+                  <a:srgbClr val="CE9178"/>
+                </a:solidFill>
+                <a:effectLst/>
+                <a:latin typeface="Consolas" panose="020B0609020204030204" pitchFamily="49" charset="0"/>
+              </a:rPr>
+              <a:t>"This is a user thread that is running"</a:t>
+            </a:r>
+            <a:r>
+              <a:rPr lang="en-US" sz="2000" b="0" dirty="0">
+                <a:solidFill>
+                  <a:srgbClr val="CCCCCC"/>
+                </a:solidFill>
+                <a:effectLst/>
+                <a:latin typeface="Consolas" panose="020B0609020204030204" pitchFamily="49" charset="0"/>
+              </a:rPr>
+              <a:t>);</a:t>
+            </a:r>
+          </a:p>
+          <a:p>
+            <a:pPr>
+              <a:buNone/>
+            </a:pPr>
+            <a:r>
+              <a:rPr lang="en-US" sz="2000" b="0" dirty="0">
+                <a:solidFill>
+                  <a:srgbClr val="CCCCCC"/>
+                </a:solidFill>
+                <a:effectLst/>
+                <a:latin typeface="Consolas" panose="020B0609020204030204" pitchFamily="49" charset="0"/>
+              </a:rPr>
+              <a:t>    }</a:t>
+            </a:r>
+          </a:p>
+          <a:p>
+            <a:r>
+              <a:rPr lang="en-US" sz="2000" b="0" dirty="0">
+                <a:solidFill>
+                  <a:srgbClr val="CCCCCC"/>
+                </a:solidFill>
+                <a:effectLst/>
+                <a:latin typeface="Consolas" panose="020B0609020204030204" pitchFamily="49" charset="0"/>
+              </a:rPr>
+              <a:t>}</a:t>
+            </a:r>
+          </a:p>
+          <a:p>
+            <a:pPr>
+              <a:lnSpc>
+                <a:spcPts val="1425"/>
+              </a:lnSpc>
+            </a:pPr>
+            <a:endParaRPr lang="en-PH" sz="2000" b="0" dirty="0">
+              <a:solidFill>
+                <a:srgbClr val="CCCCCC"/>
+              </a:solidFill>
+              <a:effectLst/>
+              <a:latin typeface="Consolas" panose="020B0609020204030204" pitchFamily="49" charset="0"/>
+            </a:endParaRPr>
+          </a:p>
+        </p:txBody>
+      </p:sp>
+      <p:sp>
+        <p:nvSpPr>
+          <p:cNvPr id="9" name="TextBox 8">
+            <a:extLst>
+              <a:ext uri="{FF2B5EF4-FFF2-40B4-BE49-F238E27FC236}">
+                <a16:creationId xmlns:a16="http://schemas.microsoft.com/office/drawing/2014/main" id="{E553F55F-6FB1-ECB9-6572-D326B1E0587E}"/>
+              </a:ext>
+            </a:extLst>
+          </p:cNvPr>
+          <p:cNvSpPr txBox="1"/>
+          <p:nvPr/>
+        </p:nvSpPr>
+        <p:spPr>
+          <a:xfrm>
+            <a:off x="606114" y="5334077"/>
+            <a:ext cx="11235265" cy="1015663"/>
+          </a:xfrm>
+          <a:prstGeom prst="rect">
+            <a:avLst/>
+          </a:prstGeom>
+          <a:noFill/>
+        </p:spPr>
+        <p:txBody>
+          <a:bodyPr wrap="square">
+            <a:spAutoFit/>
+          </a:bodyPr>
+          <a:lstStyle/>
+          <a:p>
+            <a:pPr marL="0" indent="0" algn="ctr">
+              <a:buNone/>
+            </a:pPr>
+            <a:r>
+              <a:rPr lang="en-US" sz="3000" dirty="0"/>
+              <a:t>There are two ways to create a thread. The first option is to </a:t>
+            </a:r>
+            <a:r>
+              <a:rPr lang="en-US" sz="3000" dirty="0">
+                <a:solidFill>
+                  <a:srgbClr val="0070C0"/>
+                </a:solidFill>
+              </a:rPr>
+              <a:t>extend the </a:t>
+            </a:r>
+            <a:r>
+              <a:rPr lang="en-US" sz="3000" b="1" dirty="0">
+                <a:solidFill>
+                  <a:srgbClr val="0070C0"/>
+                </a:solidFill>
+              </a:rPr>
+              <a:t>Thread</a:t>
+            </a:r>
+            <a:r>
+              <a:rPr lang="en-US" sz="3000" dirty="0">
+                <a:solidFill>
+                  <a:srgbClr val="0070C0"/>
+                </a:solidFill>
+              </a:rPr>
+              <a:t> </a:t>
+            </a:r>
+            <a:r>
+              <a:rPr lang="en-US" sz="3000" b="1" dirty="0">
+                <a:solidFill>
+                  <a:srgbClr val="0070C0"/>
+                </a:solidFill>
+              </a:rPr>
+              <a:t>class.</a:t>
+            </a:r>
+          </a:p>
+        </p:txBody>
+      </p:sp>
+      <p:grpSp>
+        <p:nvGrpSpPr>
+          <p:cNvPr id="16" name="Group 15">
+            <a:extLst>
+              <a:ext uri="{FF2B5EF4-FFF2-40B4-BE49-F238E27FC236}">
+                <a16:creationId xmlns:a16="http://schemas.microsoft.com/office/drawing/2014/main" id="{0B5904F4-9A26-8DD6-B6AE-427DDFDDA05E}"/>
+              </a:ext>
+            </a:extLst>
+          </p:cNvPr>
+          <p:cNvGrpSpPr/>
+          <p:nvPr/>
+        </p:nvGrpSpPr>
+        <p:grpSpPr>
+          <a:xfrm>
+            <a:off x="9743867" y="2058395"/>
+            <a:ext cx="1988587" cy="369332"/>
+            <a:chOff x="9913262" y="1679539"/>
+            <a:chExt cx="1988587" cy="369332"/>
+          </a:xfrm>
+        </p:grpSpPr>
+        <p:pic>
+          <p:nvPicPr>
+            <p:cNvPr id="17" name="Picture 16" descr="A paper with a logo on it&#10;&#10;AI-generated content may be incorrect.">
+              <a:extLst>
+                <a:ext uri="{FF2B5EF4-FFF2-40B4-BE49-F238E27FC236}">
+                  <a16:creationId xmlns:a16="http://schemas.microsoft.com/office/drawing/2014/main" id="{4986DE55-89DF-772F-9ED8-B72954311785}"/>
+                </a:ext>
+              </a:extLst>
+            </p:cNvPr>
+            <p:cNvPicPr>
+              <a:picLocks noChangeAspect="1"/>
+            </p:cNvPicPr>
+            <p:nvPr/>
+          </p:nvPicPr>
+          <p:blipFill>
+            <a:blip r:embed="rId2"/>
+            <a:stretch>
+              <a:fillRect/>
+            </a:stretch>
+          </p:blipFill>
+          <p:spPr>
+            <a:xfrm>
+              <a:off x="9913262" y="1679539"/>
+              <a:ext cx="360000" cy="360000"/>
+            </a:xfrm>
+            <a:prstGeom prst="rect">
+              <a:avLst/>
+            </a:prstGeom>
+          </p:spPr>
+        </p:pic>
+        <p:sp>
+          <p:nvSpPr>
+            <p:cNvPr id="18" name="TextBox 17">
+              <a:extLst>
+                <a:ext uri="{FF2B5EF4-FFF2-40B4-BE49-F238E27FC236}">
+                  <a16:creationId xmlns:a16="http://schemas.microsoft.com/office/drawing/2014/main" id="{56EA2C0C-19D5-250C-A203-14049C72A18E}"/>
+                </a:ext>
+              </a:extLst>
+            </p:cNvPr>
+            <p:cNvSpPr txBox="1"/>
+            <p:nvPr/>
+          </p:nvSpPr>
+          <p:spPr>
+            <a:xfrm>
+              <a:off x="10273262" y="1679539"/>
+              <a:ext cx="1628587" cy="369332"/>
+            </a:xfrm>
+            <a:prstGeom prst="rect">
+              <a:avLst/>
+            </a:prstGeom>
+            <a:noFill/>
+          </p:spPr>
+          <p:txBody>
+            <a:bodyPr wrap="none" rtlCol="0">
+              <a:spAutoFit/>
+            </a:bodyPr>
+            <a:lstStyle/>
+            <a:p>
+              <a:r>
+                <a:rPr lang="en-PH" dirty="0">
+                  <a:solidFill>
+                    <a:schemeClr val="bg1"/>
+                  </a:solidFill>
+                </a:rPr>
+                <a:t>MyThread.java</a:t>
+              </a:r>
+            </a:p>
+          </p:txBody>
+        </p:sp>
+      </p:grpSp>
+      <p:sp>
+        <p:nvSpPr>
+          <p:cNvPr id="19" name="Rectangle 18">
+            <a:extLst>
+              <a:ext uri="{FF2B5EF4-FFF2-40B4-BE49-F238E27FC236}">
+                <a16:creationId xmlns:a16="http://schemas.microsoft.com/office/drawing/2014/main" id="{7FC83DEE-0689-4CE5-ADD7-AC5F8CC1FC15}"/>
+              </a:ext>
+            </a:extLst>
+          </p:cNvPr>
+          <p:cNvSpPr/>
+          <p:nvPr/>
+        </p:nvSpPr>
+        <p:spPr>
+          <a:xfrm>
+            <a:off x="4034060" y="2292565"/>
+            <a:ext cx="1976775" cy="369332"/>
+          </a:xfrm>
+          <a:prstGeom prst="rect">
+            <a:avLst/>
+          </a:prstGeom>
+          <a:noFill/>
+          <a:ln w="38100">
+            <a:solidFill>
+              <a:srgbClr val="00B050"/>
+            </a:solidFill>
+          </a:ln>
+        </p:spPr>
+        <p:style>
+          <a:lnRef idx="2">
+            <a:schemeClr val="accent1">
+              <a:shade val="15000"/>
+            </a:schemeClr>
+          </a:lnRef>
+          <a:fillRef idx="1">
+            <a:schemeClr val="accent1"/>
+          </a:fillRef>
+          <a:effectRef idx="0">
+            <a:schemeClr val="accent1"/>
+          </a:effectRef>
+          <a:fontRef idx="minor">
+            <a:schemeClr val="lt1"/>
+          </a:fontRef>
+        </p:style>
+        <p:txBody>
+          <a:bodyPr rtlCol="0" anchor="ctr"/>
+          <a:lstStyle/>
+          <a:p>
+            <a:pPr algn="ctr"/>
+            <a:endParaRPr lang="en-PH"/>
+          </a:p>
+        </p:txBody>
+      </p:sp>
+      <p:sp>
+        <p:nvSpPr>
+          <p:cNvPr id="21" name="Arrow: Left 20">
+            <a:extLst>
+              <a:ext uri="{FF2B5EF4-FFF2-40B4-BE49-F238E27FC236}">
+                <a16:creationId xmlns:a16="http://schemas.microsoft.com/office/drawing/2014/main" id="{197C6AEB-FA34-110C-A17A-899EAF20D467}"/>
+              </a:ext>
+            </a:extLst>
+          </p:cNvPr>
+          <p:cNvSpPr/>
+          <p:nvPr/>
+        </p:nvSpPr>
+        <p:spPr>
+          <a:xfrm>
+            <a:off x="6223746" y="2234915"/>
+            <a:ext cx="1029724" cy="484632"/>
+          </a:xfrm>
+          <a:prstGeom prst="leftArrow">
+            <a:avLst/>
+          </a:prstGeom>
+          <a:solidFill>
+            <a:srgbClr val="00B050"/>
+          </a:solidFill>
+          <a:ln>
+            <a:solidFill>
+              <a:srgbClr val="00B050"/>
+            </a:solidFill>
+          </a:ln>
+        </p:spPr>
+        <p:style>
+          <a:lnRef idx="2">
+            <a:schemeClr val="accent1">
+              <a:shade val="15000"/>
+            </a:schemeClr>
+          </a:lnRef>
+          <a:fillRef idx="1">
+            <a:schemeClr val="accent1"/>
+          </a:fillRef>
+          <a:effectRef idx="0">
+            <a:schemeClr val="accent1"/>
+          </a:effectRef>
+          <a:fontRef idx="minor">
+            <a:schemeClr val="lt1"/>
+          </a:fontRef>
+        </p:style>
+        <p:txBody>
+          <a:bodyPr rtlCol="0" anchor="ctr"/>
+          <a:lstStyle/>
+          <a:p>
+            <a:pPr algn="ctr"/>
+            <a:endParaRPr lang="en-PH"/>
+          </a:p>
+        </p:txBody>
+      </p:sp>
+    </p:spTree>
+    <p:extLst>
+      <p:ext uri="{BB962C8B-B14F-4D97-AF65-F5344CB8AC3E}">
+        <p14:creationId xmlns:p14="http://schemas.microsoft.com/office/powerpoint/2010/main" val="3323187310"/>
+      </p:ext>
+    </p:extLst>
+  </p:cSld>
+  <p:clrMapOvr>
+    <a:masterClrMapping/>
+  </p:clrMapOvr>
+  <p:timing>
+    <p:tnLst>
+      <p:par>
+        <p:cTn id="1" dur="indefinite" restart="never" nodeType="tmRoot">
+          <p:childTnLst>
+            <p:seq concurrent="1" nextAc="seek">
+              <p:cTn id="2" dur="indefinite" nodeType="mainSeq">
+                <p:childTnLst>
+                  <p:par>
+                    <p:cTn id="3" fill="hold">
+                      <p:stCondLst>
+                        <p:cond delay="indefinite"/>
+                      </p:stCondLst>
+                      <p:childTnLst>
+                        <p:par>
+                          <p:cTn id="4" fill="hold">
+                            <p:stCondLst>
+                              <p:cond delay="0"/>
+                            </p:stCondLst>
+                            <p:childTnLst>
+                              <p:par>
+                                <p:cTn id="5" presetID="10" presetClass="entr" presetSubtype="0" fill="hold" grpId="0" nodeType="clickEffect">
+                                  <p:stCondLst>
+                                    <p:cond delay="0"/>
+                                  </p:stCondLst>
+                                  <p:childTnLst>
+                                    <p:set>
+                                      <p:cBhvr>
+                                        <p:cTn id="6" dur="1" fill="hold">
+                                          <p:stCondLst>
+                                            <p:cond delay="0"/>
+                                          </p:stCondLst>
+                                        </p:cTn>
+                                        <p:tgtEl>
+                                          <p:spTgt spid="19"/>
+                                        </p:tgtEl>
+                                        <p:attrNameLst>
+                                          <p:attrName>style.visibility</p:attrName>
+                                        </p:attrNameLst>
+                                      </p:cBhvr>
+                                      <p:to>
+                                        <p:strVal val="visible"/>
+                                      </p:to>
+                                    </p:set>
+                                    <p:animEffect transition="in" filter="fade">
+                                      <p:cBhvr>
+                                        <p:cTn id="7" dur="500"/>
+                                        <p:tgtEl>
+                                          <p:spTgt spid="19"/>
+                                        </p:tgtEl>
+                                      </p:cBhvr>
+                                    </p:animEffect>
+                                  </p:childTnLst>
+                                </p:cTn>
+                              </p:par>
+                            </p:childTnLst>
+                          </p:cTn>
+                        </p:par>
+                      </p:childTnLst>
+                    </p:cTn>
+                  </p:par>
+                  <p:par>
+                    <p:cTn id="8" fill="hold">
+                      <p:stCondLst>
+                        <p:cond delay="indefinite"/>
+                      </p:stCondLst>
+                      <p:childTnLst>
+                        <p:par>
+                          <p:cTn id="9" fill="hold">
+                            <p:stCondLst>
+                              <p:cond delay="0"/>
+                            </p:stCondLst>
+                            <p:childTnLst>
+                              <p:par>
+                                <p:cTn id="10" presetID="10" presetClass="entr" presetSubtype="0" fill="hold" grpId="0" nodeType="clickEffect">
+                                  <p:stCondLst>
+                                    <p:cond delay="0"/>
+                                  </p:stCondLst>
+                                  <p:childTnLst>
+                                    <p:set>
+                                      <p:cBhvr>
+                                        <p:cTn id="11" dur="1" fill="hold">
+                                          <p:stCondLst>
+                                            <p:cond delay="0"/>
+                                          </p:stCondLst>
+                                        </p:cTn>
+                                        <p:tgtEl>
+                                          <p:spTgt spid="21"/>
+                                        </p:tgtEl>
+                                        <p:attrNameLst>
+                                          <p:attrName>style.visibility</p:attrName>
+                                        </p:attrNameLst>
+                                      </p:cBhvr>
+                                      <p:to>
+                                        <p:strVal val="visible"/>
+                                      </p:to>
+                                    </p:set>
+                                    <p:animEffect transition="in" filter="fade">
+                                      <p:cBhvr>
+                                        <p:cTn id="12" dur="500"/>
+                                        <p:tgtEl>
+                                          <p:spTgt spid="21"/>
+                                        </p:tgtEl>
+                                      </p:cBhvr>
+                                    </p:animEffect>
+                                  </p:childTnLst>
+                                </p:cTn>
+                              </p:par>
+                            </p:childTnLst>
+                          </p:cTn>
+                        </p:par>
+                      </p:childTnLst>
+                    </p:cTn>
+                  </p:par>
+                </p:childTnLst>
+              </p:cTn>
+              <p:prevCondLst>
+                <p:cond evt="onPrev" delay="0">
+                  <p:tgtEl>
+                    <p:sldTgt/>
+                  </p:tgtEl>
+                </p:cond>
+              </p:prevCondLst>
+              <p:nextCondLst>
+                <p:cond evt="onNext" delay="0">
+                  <p:tgtEl>
+                    <p:sldTgt/>
+                  </p:tgtEl>
+                </p:cond>
+              </p:nextCondLst>
+            </p:seq>
+          </p:childTnLst>
+        </p:cTn>
+      </p:par>
+    </p:tnLst>
+    <p:bldLst>
+      <p:bldP spid="19" grpId="0" animBg="1"/>
+      <p:bldP spid="21" grpId="0" animBg="1"/>
+    </p:bldLst>
+  </p:timing>
+</p:sld>
+</file>
+
+<file path=ppt/slides/slide11.xml><?xml version="1.0" encoding="utf-8"?>
+<p:sld xmlns:a="http://schemas.openxmlformats.org/drawingml/2006/main" xmlns:r="http://schemas.openxmlformats.org/officeDocument/2006/relationships" xmlns:p="http://schemas.openxmlformats.org/presentationml/2006/main">
+  <p:cSld>
+    <p:spTree>
+      <p:nvGrpSpPr>
         <p:cNvPr id="1" name="">
           <a:extLst>
             <a:ext uri="{FF2B5EF4-FFF2-40B4-BE49-F238E27FC236}">
@@ -11408,7 +12572,7 @@
 </p:sld>
 </file>
 
-<file path=ppt/slides/slide11.xml><?xml version="1.0" encoding="utf-8"?>
+<file path=ppt/slides/slide12.xml><?xml version="1.0" encoding="utf-8"?>
 <p:sld xmlns:a="http://schemas.openxmlformats.org/drawingml/2006/main" xmlns:r="http://schemas.openxmlformats.org/officeDocument/2006/relationships" xmlns:p="http://schemas.openxmlformats.org/presentationml/2006/main" showMasterSp="0">
   <p:cSld>
     <p:spTree>
@@ -12238,7 +13402,7 @@
 </p:sld>
 </file>
 
-<file path=ppt/slides/slide12.xml><?xml version="1.0" encoding="utf-8"?>
+<file path=ppt/slides/slide13.xml><?xml version="1.0" encoding="utf-8"?>
 <p:sld xmlns:a="http://schemas.openxmlformats.org/drawingml/2006/main" xmlns:r="http://schemas.openxmlformats.org/officeDocument/2006/relationships" xmlns:p="http://schemas.openxmlformats.org/presentationml/2006/main" showMasterSp="0">
   <p:cSld>
     <p:spTree>
@@ -13170,7 +14334,7 @@
 </p:sld>
 </file>
 
-<file path=ppt/slides/slide13.xml><?xml version="1.0" encoding="utf-8"?>
+<file path=ppt/slides/slide14.xml><?xml version="1.0" encoding="utf-8"?>
 <p:sld xmlns:a="http://schemas.openxmlformats.org/drawingml/2006/main" xmlns:r="http://schemas.openxmlformats.org/officeDocument/2006/relationships" xmlns:p="http://schemas.openxmlformats.org/presentationml/2006/main" showMasterSp="0">
   <p:cSld>
     <p:spTree>
@@ -14108,7 +15272,7 @@
 </p:sld>
 </file>
 
-<file path=ppt/slides/slide14.xml><?xml version="1.0" encoding="utf-8"?>
+<file path=ppt/slides/slide15.xml><?xml version="1.0" encoding="utf-8"?>
 <p:sld xmlns:a="http://schemas.openxmlformats.org/drawingml/2006/main" xmlns:r="http://schemas.openxmlformats.org/officeDocument/2006/relationships" xmlns:p="http://schemas.openxmlformats.org/presentationml/2006/main" showMasterSp="0">
   <p:cSld>
     <p:spTree>
@@ -15046,7 +16210,7 @@
 </p:sld>
 </file>
 
-<file path=ppt/slides/slide15.xml><?xml version="1.0" encoding="utf-8"?>
+<file path=ppt/slides/slide16.xml><?xml version="1.0" encoding="utf-8"?>
 <p:sld xmlns:a="http://schemas.openxmlformats.org/drawingml/2006/main" xmlns:r="http://schemas.openxmlformats.org/officeDocument/2006/relationships" xmlns:p="http://schemas.openxmlformats.org/presentationml/2006/main" showMasterSp="0">
   <p:cSld>
     <p:spTree>
@@ -15990,7 +17154,7 @@
 </p:sld>
 </file>
 
-<file path=ppt/slides/slide16.xml><?xml version="1.0" encoding="utf-8"?>
+<file path=ppt/slides/slide17.xml><?xml version="1.0" encoding="utf-8"?>
 <p:sld xmlns:a="http://schemas.openxmlformats.org/drawingml/2006/main" xmlns:r="http://schemas.openxmlformats.org/officeDocument/2006/relationships" xmlns:p="http://schemas.openxmlformats.org/presentationml/2006/main" showMasterSp="0">
   <p:cSld>
     <p:spTree>
@@ -16922,7 +18086,7 @@
 </p:sld>
 </file>
 
-<file path=ppt/slides/slide17.xml><?xml version="1.0" encoding="utf-8"?>
+<file path=ppt/slides/slide18.xml><?xml version="1.0" encoding="utf-8"?>
 <p:sld xmlns:a="http://schemas.openxmlformats.org/drawingml/2006/main" xmlns:r="http://schemas.openxmlformats.org/officeDocument/2006/relationships" xmlns:p="http://schemas.openxmlformats.org/presentationml/2006/main">
   <p:cSld>
     <p:spTree>
@@ -17980,7 +19144,7 @@
 </p:sld>
 </file>
 
-<file path=ppt/slides/slide18.xml><?xml version="1.0" encoding="utf-8"?>
+<file path=ppt/slides/slide19.xml><?xml version="1.0" encoding="utf-8"?>
 <p:sld xmlns:a="http://schemas.openxmlformats.org/drawingml/2006/main" xmlns:r="http://schemas.openxmlformats.org/officeDocument/2006/relationships" xmlns:p="http://schemas.openxmlformats.org/presentationml/2006/main">
   <p:cSld>
     <p:spTree>
@@ -18795,112 +19959,6 @@
 </p:sld>
 </file>
 
-<file path=ppt/slides/slide19.xml><?xml version="1.0" encoding="utf-8"?>
-<p:sld xmlns:a="http://schemas.openxmlformats.org/drawingml/2006/main" xmlns:r="http://schemas.openxmlformats.org/officeDocument/2006/relationships" xmlns:p="http://schemas.openxmlformats.org/presentationml/2006/main">
-  <p:cSld>
-    <p:spTree>
-      <p:nvGrpSpPr>
-        <p:cNvPr id="1" name=""/>
-        <p:cNvGrpSpPr/>
-        <p:nvPr/>
-      </p:nvGrpSpPr>
-      <p:grpSpPr>
-        <a:xfrm>
-          <a:off x="0" y="0"/>
-          <a:ext cx="0" cy="0"/>
-          <a:chOff x="0" y="0"/>
-          <a:chExt cx="0" cy="0"/>
-        </a:xfrm>
-      </p:grpSpPr>
-      <p:sp>
-        <p:nvSpPr>
-          <p:cNvPr id="2" name="Title 1">
-            <a:extLst>
-              <a:ext uri="{FF2B5EF4-FFF2-40B4-BE49-F238E27FC236}">
-                <a16:creationId xmlns:a16="http://schemas.microsoft.com/office/drawing/2014/main" id="{5BC8E338-89E4-4A1B-7DF6-8C04BE92DE82}"/>
-              </a:ext>
-            </a:extLst>
-          </p:cNvPr>
-          <p:cNvSpPr>
-            <a:spLocks noGrp="1"/>
-          </p:cNvSpPr>
-          <p:nvPr>
-            <p:ph type="title"/>
-          </p:nvPr>
-        </p:nvSpPr>
-        <p:spPr/>
-        <p:txBody>
-          <a:bodyPr/>
-          <a:lstStyle/>
-          <a:p>
-            <a:r>
-              <a:rPr lang="en-PH" dirty="0"/>
-              <a:t>Daemon Threads</a:t>
-            </a:r>
-          </a:p>
-        </p:txBody>
-      </p:sp>
-      <p:sp>
-        <p:nvSpPr>
-          <p:cNvPr id="3" name="Content Placeholder 2">
-            <a:extLst>
-              <a:ext uri="{FF2B5EF4-FFF2-40B4-BE49-F238E27FC236}">
-                <a16:creationId xmlns:a16="http://schemas.microsoft.com/office/drawing/2014/main" id="{92DEBCC5-D93A-1854-43F3-66D74EBB23B7}"/>
-              </a:ext>
-            </a:extLst>
-          </p:cNvPr>
-          <p:cNvSpPr>
-            <a:spLocks noGrp="1"/>
-          </p:cNvSpPr>
-          <p:nvPr>
-            <p:ph idx="1"/>
-          </p:nvPr>
-        </p:nvSpPr>
-        <p:spPr/>
-        <p:txBody>
-          <a:bodyPr/>
-          <a:lstStyle/>
-          <a:p>
-            <a:pPr marL="0" indent="0" algn="l">
-              <a:buNone/>
-            </a:pPr>
-            <a:r>
-              <a:rPr lang="en-US" dirty="0"/>
-              <a:t>A </a:t>
-            </a:r>
-            <a:r>
-              <a:rPr lang="en-US" b="1" dirty="0"/>
-              <a:t>daemon thread</a:t>
-            </a:r>
-            <a:r>
-              <a:rPr lang="en-US" dirty="0"/>
-              <a:t> is a background thread that does not prevent the Java Virtual Machine (JVM) from exiting when all </a:t>
-            </a:r>
-            <a:r>
-              <a:rPr lang="en-US" b="1" dirty="0"/>
-              <a:t>user (non-daemon)</a:t>
-            </a:r>
-            <a:r>
-              <a:rPr lang="en-US" dirty="0"/>
-              <a:t> threads finish execution.</a:t>
-            </a:r>
-            <a:endParaRPr lang="en-US" sz="2800" dirty="0"/>
-          </a:p>
-        </p:txBody>
-      </p:sp>
-    </p:spTree>
-    <p:extLst>
-      <p:ext uri="{BB962C8B-B14F-4D97-AF65-F5344CB8AC3E}">
-        <p14:creationId xmlns:p14="http://schemas.microsoft.com/office/powerpoint/2010/main" val="146352155"/>
-      </p:ext>
-    </p:extLst>
-  </p:cSld>
-  <p:clrMapOvr>
-    <a:masterClrMapping/>
-  </p:clrMapOvr>
-</p:sld>
-</file>
-
 <file path=ppt/slides/slide2.xml><?xml version="1.0" encoding="utf-8"?>
 <p:sld xmlns:a="http://schemas.openxmlformats.org/drawingml/2006/main" xmlns:r="http://schemas.openxmlformats.org/officeDocument/2006/relationships" xmlns:p="http://schemas.openxmlformats.org/presentationml/2006/main">
   <p:cSld>
@@ -19094,6 +20152,112 @@
 </file>
 
 <file path=ppt/slides/slide20.xml><?xml version="1.0" encoding="utf-8"?>
+<p:sld xmlns:a="http://schemas.openxmlformats.org/drawingml/2006/main" xmlns:r="http://schemas.openxmlformats.org/officeDocument/2006/relationships" xmlns:p="http://schemas.openxmlformats.org/presentationml/2006/main">
+  <p:cSld>
+    <p:spTree>
+      <p:nvGrpSpPr>
+        <p:cNvPr id="1" name=""/>
+        <p:cNvGrpSpPr/>
+        <p:nvPr/>
+      </p:nvGrpSpPr>
+      <p:grpSpPr>
+        <a:xfrm>
+          <a:off x="0" y="0"/>
+          <a:ext cx="0" cy="0"/>
+          <a:chOff x="0" y="0"/>
+          <a:chExt cx="0" cy="0"/>
+        </a:xfrm>
+      </p:grpSpPr>
+      <p:sp>
+        <p:nvSpPr>
+          <p:cNvPr id="2" name="Title 1">
+            <a:extLst>
+              <a:ext uri="{FF2B5EF4-FFF2-40B4-BE49-F238E27FC236}">
+                <a16:creationId xmlns:a16="http://schemas.microsoft.com/office/drawing/2014/main" id="{5BC8E338-89E4-4A1B-7DF6-8C04BE92DE82}"/>
+              </a:ext>
+            </a:extLst>
+          </p:cNvPr>
+          <p:cNvSpPr>
+            <a:spLocks noGrp="1"/>
+          </p:cNvSpPr>
+          <p:nvPr>
+            <p:ph type="title"/>
+          </p:nvPr>
+        </p:nvSpPr>
+        <p:spPr/>
+        <p:txBody>
+          <a:bodyPr/>
+          <a:lstStyle/>
+          <a:p>
+            <a:r>
+              <a:rPr lang="en-PH" dirty="0"/>
+              <a:t>Daemon Threads</a:t>
+            </a:r>
+          </a:p>
+        </p:txBody>
+      </p:sp>
+      <p:sp>
+        <p:nvSpPr>
+          <p:cNvPr id="3" name="Content Placeholder 2">
+            <a:extLst>
+              <a:ext uri="{FF2B5EF4-FFF2-40B4-BE49-F238E27FC236}">
+                <a16:creationId xmlns:a16="http://schemas.microsoft.com/office/drawing/2014/main" id="{92DEBCC5-D93A-1854-43F3-66D74EBB23B7}"/>
+              </a:ext>
+            </a:extLst>
+          </p:cNvPr>
+          <p:cNvSpPr>
+            <a:spLocks noGrp="1"/>
+          </p:cNvSpPr>
+          <p:nvPr>
+            <p:ph idx="1"/>
+          </p:nvPr>
+        </p:nvSpPr>
+        <p:spPr/>
+        <p:txBody>
+          <a:bodyPr/>
+          <a:lstStyle/>
+          <a:p>
+            <a:pPr marL="0" indent="0" algn="l">
+              <a:buNone/>
+            </a:pPr>
+            <a:r>
+              <a:rPr lang="en-US" dirty="0"/>
+              <a:t>A </a:t>
+            </a:r>
+            <a:r>
+              <a:rPr lang="en-US" b="1" dirty="0"/>
+              <a:t>daemon thread</a:t>
+            </a:r>
+            <a:r>
+              <a:rPr lang="en-US" dirty="0"/>
+              <a:t> is a background thread that does not prevent the Java Virtual Machine (JVM) from exiting when all </a:t>
+            </a:r>
+            <a:r>
+              <a:rPr lang="en-US" b="1" dirty="0"/>
+              <a:t>user (non-daemon)</a:t>
+            </a:r>
+            <a:r>
+              <a:rPr lang="en-US" dirty="0"/>
+              <a:t> threads finish execution.</a:t>
+            </a:r>
+            <a:endParaRPr lang="en-US" sz="2800" dirty="0"/>
+          </a:p>
+        </p:txBody>
+      </p:sp>
+    </p:spTree>
+    <p:extLst>
+      <p:ext uri="{BB962C8B-B14F-4D97-AF65-F5344CB8AC3E}">
+        <p14:creationId xmlns:p14="http://schemas.microsoft.com/office/powerpoint/2010/main" val="146352155"/>
+      </p:ext>
+    </p:extLst>
+  </p:cSld>
+  <p:clrMapOvr>
+    <a:masterClrMapping/>
+  </p:clrMapOvr>
+</p:sld>
+</file>
+
+<file path=ppt/slides/slide21.xml><?xml version="1.0" encoding="utf-8"?>
 <p:sld xmlns:a="http://schemas.openxmlformats.org/drawingml/2006/main" xmlns:r="http://schemas.openxmlformats.org/officeDocument/2006/relationships" xmlns:p="http://schemas.openxmlformats.org/presentationml/2006/main">
   <p:cSld>
     <p:spTree>
@@ -19212,7 +20376,7 @@
 </p:sld>
 </file>
 
-<file path=ppt/slides/slide21.xml><?xml version="1.0" encoding="utf-8"?>
+<file path=ppt/slides/slide22.xml><?xml version="1.0" encoding="utf-8"?>
 <p:sld xmlns:a="http://schemas.openxmlformats.org/drawingml/2006/main" xmlns:r="http://schemas.openxmlformats.org/officeDocument/2006/relationships" xmlns:p="http://schemas.openxmlformats.org/presentationml/2006/main">
   <p:cSld>
     <p:spTree>
@@ -19258,8 +20422,13 @@
           <a:p>
             <a:r>
               <a:rPr lang="en-PH" dirty="0"/>
-              <a:t>Creating a Thread</a:t>
-            </a:r>
+              <a:t>Creating </a:t>
+            </a:r>
+            <a:r>
+              <a:rPr lang="en-PH"/>
+              <a:t>a Daemon Thread</a:t>
+            </a:r>
+            <a:endParaRPr lang="en-PH" dirty="0"/>
           </a:p>
         </p:txBody>
       </p:sp>
@@ -21144,10 +22313,10 @@
       </p:sp>
       <p:pic>
         <p:nvPicPr>
-          <p:cNvPr id="6" name="Picture 5" descr="A group of people sitting around a table&#10;&#10;AI-generated content may be incorrect.">
-            <a:extLst>
-              <a:ext uri="{FF2B5EF4-FFF2-40B4-BE49-F238E27FC236}">
-                <a16:creationId xmlns:a16="http://schemas.microsoft.com/office/drawing/2014/main" id="{C119A3E0-E087-C82D-2C58-5FA7432C9B1B}"/>
+          <p:cNvPr id="4" name="Picture 3" descr="A group of spools of thread&#10;&#10;AI-generated content may be incorrect.">
+            <a:extLst>
+              <a:ext uri="{FF2B5EF4-FFF2-40B4-BE49-F238E27FC236}">
+                <a16:creationId xmlns:a16="http://schemas.microsoft.com/office/drawing/2014/main" id="{11194117-D4C7-CBBD-3B8D-36B22FBF4801}"/>
               </a:ext>
             </a:extLst>
           </p:cNvPr>
@@ -21164,8 +22333,8 @@
         </p:blipFill>
         <p:spPr>
           <a:xfrm>
-            <a:off x="7072000" y="2229882"/>
-            <a:ext cx="5120000" cy="2880000"/>
+            <a:off x="7924800" y="2202732"/>
+            <a:ext cx="3429000" cy="3429000"/>
           </a:xfrm>
           <a:prstGeom prst="rect">
             <a:avLst/>
@@ -21269,7 +22438,7 @@
         </p:spPr>
         <p:txBody>
           <a:bodyPr>
-            <a:normAutofit fontScale="92500" lnSpcReduction="20000"/>
+            <a:normAutofit/>
           </a:bodyPr>
           <a:lstStyle/>
           <a:p>
@@ -21299,27 +22468,6 @@
               <a:rPr lang="en-US" sz="2800" dirty="0"/>
               <a:t>Each thread are independent, they do not affect execution of other threads. An exception in one thread will not interrupt other threads</a:t>
             </a:r>
-          </a:p>
-          <a:p>
-            <a:pPr marL="0" indent="0" algn="l">
-              <a:buNone/>
-            </a:pPr>
-            <a:endParaRPr lang="en-US" sz="2800" dirty="0"/>
-          </a:p>
-          <a:p>
-            <a:pPr marL="0" indent="0" algn="l">
-              <a:buNone/>
-            </a:pPr>
-            <a:r>
-              <a:rPr lang="en-US" sz="2800" dirty="0"/>
-              <a:t>Mostly used for serving multiple clients, multiplayer games or other mutually independent tasks.</a:t>
-            </a:r>
-          </a:p>
-          <a:p>
-            <a:pPr marL="0" indent="0" algn="l">
-              <a:buNone/>
-            </a:pPr>
-            <a:endParaRPr lang="en-US" sz="2800" dirty="0"/>
           </a:p>
           <a:p>
             <a:pPr marL="0" indent="0" algn="l">
@@ -21377,6 +22525,159 @@
   <p:cSld>
     <p:spTree>
       <p:nvGrpSpPr>
+        <p:cNvPr id="1" name="">
+          <a:extLst>
+            <a:ext uri="{FF2B5EF4-FFF2-40B4-BE49-F238E27FC236}">
+              <a16:creationId xmlns:a16="http://schemas.microsoft.com/office/drawing/2014/main" id="{BD417084-DDB5-0625-9C35-8D107CB7A904}"/>
+            </a:ext>
+          </a:extLst>
+        </p:cNvPr>
+        <p:cNvGrpSpPr/>
+        <p:nvPr/>
+      </p:nvGrpSpPr>
+      <p:grpSpPr>
+        <a:xfrm>
+          <a:off x="0" y="0"/>
+          <a:ext cx="0" cy="0"/>
+          <a:chOff x="0" y="0"/>
+          <a:chExt cx="0" cy="0"/>
+        </a:xfrm>
+      </p:grpSpPr>
+      <p:sp>
+        <p:nvSpPr>
+          <p:cNvPr id="2" name="Title 1">
+            <a:extLst>
+              <a:ext uri="{FF2B5EF4-FFF2-40B4-BE49-F238E27FC236}">
+                <a16:creationId xmlns:a16="http://schemas.microsoft.com/office/drawing/2014/main" id="{1B2F118C-FEB8-B484-1634-5FD5AAB73C17}"/>
+              </a:ext>
+            </a:extLst>
+          </p:cNvPr>
+          <p:cNvSpPr>
+            <a:spLocks noGrp="1"/>
+          </p:cNvSpPr>
+          <p:nvPr>
+            <p:ph type="title"/>
+          </p:nvPr>
+        </p:nvSpPr>
+        <p:spPr/>
+        <p:txBody>
+          <a:bodyPr/>
+          <a:lstStyle/>
+          <a:p>
+            <a:r>
+              <a:rPr lang="en-US" dirty="0">
+                <a:solidFill>
+                  <a:srgbClr val="002060"/>
+                </a:solidFill>
+              </a:rPr>
+              <a:t>Multithreading</a:t>
+            </a:r>
+            <a:endParaRPr lang="en-PH" dirty="0">
+              <a:solidFill>
+                <a:srgbClr val="002060"/>
+              </a:solidFill>
+            </a:endParaRPr>
+          </a:p>
+        </p:txBody>
+      </p:sp>
+      <p:sp>
+        <p:nvSpPr>
+          <p:cNvPr id="3" name="Content Placeholder 2">
+            <a:extLst>
+              <a:ext uri="{FF2B5EF4-FFF2-40B4-BE49-F238E27FC236}">
+                <a16:creationId xmlns:a16="http://schemas.microsoft.com/office/drawing/2014/main" id="{6336A73A-EF95-E3A8-0485-0780FC001881}"/>
+              </a:ext>
+            </a:extLst>
+          </p:cNvPr>
+          <p:cNvSpPr>
+            <a:spLocks noGrp="1"/>
+          </p:cNvSpPr>
+          <p:nvPr>
+            <p:ph idx="1"/>
+          </p:nvPr>
+        </p:nvSpPr>
+        <p:spPr>
+          <a:xfrm>
+            <a:off x="838200" y="2286869"/>
+            <a:ext cx="6355976" cy="4351338"/>
+          </a:xfrm>
+        </p:spPr>
+        <p:txBody>
+          <a:bodyPr>
+            <a:normAutofit/>
+          </a:bodyPr>
+          <a:lstStyle/>
+          <a:p>
+            <a:pPr marL="0" indent="0" algn="l">
+              <a:buNone/>
+            </a:pPr>
+            <a:r>
+              <a:rPr lang="en-US" sz="2800" dirty="0"/>
+              <a:t>Mostly used for serving multiple clients, multiplayer games or other mutually independent tasks.</a:t>
+            </a:r>
+          </a:p>
+          <a:p>
+            <a:pPr marL="0" indent="0" algn="l">
+              <a:buNone/>
+            </a:pPr>
+            <a:endParaRPr lang="en-US" sz="2800" dirty="0"/>
+          </a:p>
+          <a:p>
+            <a:pPr marL="0" indent="0" algn="l">
+              <a:buNone/>
+            </a:pPr>
+            <a:endParaRPr lang="en-US" sz="2800" dirty="0"/>
+          </a:p>
+        </p:txBody>
+      </p:sp>
+      <p:pic>
+        <p:nvPicPr>
+          <p:cNvPr id="6" name="Picture 5" descr="A group of spools of thread&#10;&#10;AI-generated content may be incorrect.">
+            <a:extLst>
+              <a:ext uri="{FF2B5EF4-FFF2-40B4-BE49-F238E27FC236}">
+                <a16:creationId xmlns:a16="http://schemas.microsoft.com/office/drawing/2014/main" id="{FDB926C0-212C-BE74-0FD5-B45257EAD4BF}"/>
+              </a:ext>
+            </a:extLst>
+          </p:cNvPr>
+          <p:cNvPicPr>
+            <a:picLocks noChangeAspect="1"/>
+          </p:cNvPicPr>
+          <p:nvPr/>
+        </p:nvPicPr>
+        <p:blipFill>
+          <a:blip r:embed="rId2"/>
+          <a:stretch>
+            <a:fillRect/>
+          </a:stretch>
+        </p:blipFill>
+        <p:spPr>
+          <a:xfrm>
+            <a:off x="7924800" y="2202732"/>
+            <a:ext cx="3429000" cy="3429000"/>
+          </a:xfrm>
+          <a:prstGeom prst="rect">
+            <a:avLst/>
+          </a:prstGeom>
+        </p:spPr>
+      </p:pic>
+    </p:spTree>
+    <p:extLst>
+      <p:ext uri="{BB962C8B-B14F-4D97-AF65-F5344CB8AC3E}">
+        <p14:creationId xmlns:p14="http://schemas.microsoft.com/office/powerpoint/2010/main" val="458154315"/>
+      </p:ext>
+    </p:extLst>
+  </p:cSld>
+  <p:clrMapOvr>
+    <a:masterClrMapping/>
+  </p:clrMapOvr>
+</p:sld>
+</file>
+
+<file path=ppt/slides/slide8.xml><?xml version="1.0" encoding="utf-8"?>
+<p:sld xmlns:a="http://schemas.openxmlformats.org/drawingml/2006/main" xmlns:r="http://schemas.openxmlformats.org/officeDocument/2006/relationships" xmlns:p="http://schemas.openxmlformats.org/presentationml/2006/main">
+  <p:cSld>
+    <p:spTree>
+      <p:nvGrpSpPr>
         <p:cNvPr id="1" name=""/>
         <p:cNvGrpSpPr/>
         <p:nvPr/>
@@ -21501,7 +22802,7 @@
 </p:sld>
 </file>
 
-<file path=ppt/slides/slide8.xml><?xml version="1.0" encoding="utf-8"?>
+<file path=ppt/slides/slide9.xml><?xml version="1.0" encoding="utf-8"?>
 <p:sld xmlns:a="http://schemas.openxmlformats.org/drawingml/2006/main" xmlns:r="http://schemas.openxmlformats.org/officeDocument/2006/relationships" xmlns:p="http://schemas.openxmlformats.org/presentationml/2006/main">
   <p:cSld>
     <p:spTree>
@@ -21633,1169 +22934,6 @@
   <p:clrMapOvr>
     <a:masterClrMapping/>
   </p:clrMapOvr>
-</p:sld>
-</file>
-
-<file path=ppt/slides/slide9.xml><?xml version="1.0" encoding="utf-8"?>
-<p:sld xmlns:a="http://schemas.openxmlformats.org/drawingml/2006/main" xmlns:r="http://schemas.openxmlformats.org/officeDocument/2006/relationships" xmlns:p="http://schemas.openxmlformats.org/presentationml/2006/main">
-  <p:cSld>
-    <p:spTree>
-      <p:nvGrpSpPr>
-        <p:cNvPr id="1" name=""/>
-        <p:cNvGrpSpPr/>
-        <p:nvPr/>
-      </p:nvGrpSpPr>
-      <p:grpSpPr>
-        <a:xfrm>
-          <a:off x="0" y="0"/>
-          <a:ext cx="0" cy="0"/>
-          <a:chOff x="0" y="0"/>
-          <a:chExt cx="0" cy="0"/>
-        </a:xfrm>
-      </p:grpSpPr>
-      <p:sp>
-        <p:nvSpPr>
-          <p:cNvPr id="2" name="Title 1">
-            <a:extLst>
-              <a:ext uri="{FF2B5EF4-FFF2-40B4-BE49-F238E27FC236}">
-                <a16:creationId xmlns:a16="http://schemas.microsoft.com/office/drawing/2014/main" id="{4D4C379C-2D30-02FF-A63C-8FDC0BA4F39E}"/>
-              </a:ext>
-            </a:extLst>
-          </p:cNvPr>
-          <p:cNvSpPr>
-            <a:spLocks noGrp="1"/>
-          </p:cNvSpPr>
-          <p:nvPr>
-            <p:ph type="title"/>
-          </p:nvPr>
-        </p:nvSpPr>
-        <p:spPr/>
-        <p:txBody>
-          <a:bodyPr/>
-          <a:lstStyle/>
-          <a:p>
-            <a:r>
-              <a:rPr lang="en-PH" dirty="0"/>
-              <a:t>Creating a Thread</a:t>
-            </a:r>
-          </a:p>
-        </p:txBody>
-      </p:sp>
-      <p:grpSp>
-        <p:nvGrpSpPr>
-          <p:cNvPr id="4" name="Group 3">
-            <a:extLst>
-              <a:ext uri="{FF2B5EF4-FFF2-40B4-BE49-F238E27FC236}">
-                <a16:creationId xmlns:a16="http://schemas.microsoft.com/office/drawing/2014/main" id="{41847312-5381-CEFF-68DE-DDC94E950628}"/>
-              </a:ext>
-            </a:extLst>
-          </p:cNvPr>
-          <p:cNvGrpSpPr/>
-          <p:nvPr/>
-        </p:nvGrpSpPr>
-        <p:grpSpPr>
-          <a:xfrm>
-            <a:off x="10001402" y="1969851"/>
-            <a:ext cx="1712230" cy="369332"/>
-            <a:chOff x="9913262" y="1679539"/>
-            <a:chExt cx="1712230" cy="369332"/>
-          </a:xfrm>
-        </p:grpSpPr>
-        <p:pic>
-          <p:nvPicPr>
-            <p:cNvPr id="5" name="Picture 4" descr="A paper with a logo on it&#10;&#10;AI-generated content may be incorrect.">
-              <a:extLst>
-                <a:ext uri="{FF2B5EF4-FFF2-40B4-BE49-F238E27FC236}">
-                  <a16:creationId xmlns:a16="http://schemas.microsoft.com/office/drawing/2014/main" id="{101C3336-D9EE-FAC3-EC55-17D4C0A8918A}"/>
-                </a:ext>
-              </a:extLst>
-            </p:cNvPr>
-            <p:cNvPicPr>
-              <a:picLocks noChangeAspect="1"/>
-            </p:cNvPicPr>
-            <p:nvPr/>
-          </p:nvPicPr>
-          <p:blipFill>
-            <a:blip r:embed="rId2"/>
-            <a:stretch>
-              <a:fillRect/>
-            </a:stretch>
-          </p:blipFill>
-          <p:spPr>
-            <a:xfrm>
-              <a:off x="9913262" y="1679539"/>
-              <a:ext cx="360000" cy="360000"/>
-            </a:xfrm>
-            <a:prstGeom prst="rect">
-              <a:avLst/>
-            </a:prstGeom>
-          </p:spPr>
-        </p:pic>
-        <p:sp>
-          <p:nvSpPr>
-            <p:cNvPr id="6" name="TextBox 5">
-              <a:extLst>
-                <a:ext uri="{FF2B5EF4-FFF2-40B4-BE49-F238E27FC236}">
-                  <a16:creationId xmlns:a16="http://schemas.microsoft.com/office/drawing/2014/main" id="{59DAD33F-EB3D-77DA-4971-62CD2DC2538A}"/>
-                </a:ext>
-              </a:extLst>
-            </p:cNvPr>
-            <p:cNvSpPr txBox="1"/>
-            <p:nvPr/>
-          </p:nvSpPr>
-          <p:spPr>
-            <a:xfrm>
-              <a:off x="10273262" y="1679539"/>
-              <a:ext cx="1352230" cy="369332"/>
-            </a:xfrm>
-            <a:prstGeom prst="rect">
-              <a:avLst/>
-            </a:prstGeom>
-            <a:noFill/>
-          </p:spPr>
-          <p:txBody>
-            <a:bodyPr wrap="none" rtlCol="0">
-              <a:spAutoFit/>
-            </a:bodyPr>
-            <a:lstStyle/>
-            <a:p>
-              <a:r>
-                <a:rPr lang="en-PH" dirty="0">
-                  <a:solidFill>
-                    <a:schemeClr val="bg1"/>
-                  </a:solidFill>
-                </a:rPr>
-                <a:t>Animal.java</a:t>
-              </a:r>
-            </a:p>
-          </p:txBody>
-        </p:sp>
-      </p:grpSp>
-      <p:sp>
-        <p:nvSpPr>
-          <p:cNvPr id="7" name="Content Placeholder 2">
-            <a:extLst>
-              <a:ext uri="{FF2B5EF4-FFF2-40B4-BE49-F238E27FC236}">
-                <a16:creationId xmlns:a16="http://schemas.microsoft.com/office/drawing/2014/main" id="{945577EA-1D1A-72BE-24F9-5A23EEC2C9BF}"/>
-              </a:ext>
-            </a:extLst>
-          </p:cNvPr>
-          <p:cNvSpPr txBox="1">
-            <a:spLocks/>
-          </p:cNvSpPr>
-          <p:nvPr/>
-        </p:nvSpPr>
-        <p:spPr>
-          <a:xfrm>
-            <a:off x="606114" y="1949823"/>
-            <a:ext cx="11235266" cy="3173505"/>
-          </a:xfrm>
-          <a:prstGeom prst="rect">
-            <a:avLst/>
-          </a:prstGeom>
-          <a:solidFill>
-            <a:schemeClr val="tx1"/>
-          </a:solidFill>
-        </p:spPr>
-        <p:txBody>
-          <a:bodyPr vert="horz" lIns="91440" tIns="45720" rIns="91440" bIns="45720" rtlCol="0">
-            <a:normAutofit/>
-          </a:bodyPr>
-          <a:lstStyle>
-            <a:lvl1pPr marL="0" indent="0" algn="ctr" defTabSz="914400" rtl="0" eaLnBrk="1" latinLnBrk="0" hangingPunct="1">
-              <a:lnSpc>
-                <a:spcPct val="90000"/>
-              </a:lnSpc>
-              <a:spcBef>
-                <a:spcPts val="1000"/>
-              </a:spcBef>
-              <a:buFont typeface="Arial" panose="020B0604020202020204" pitchFamily="34" charset="0"/>
-              <a:buNone/>
-              <a:defRPr sz="2400" kern="1200">
-                <a:solidFill>
-                  <a:schemeClr val="tx1"/>
-                </a:solidFill>
-                <a:latin typeface="+mn-lt"/>
-                <a:ea typeface="+mn-ea"/>
-                <a:cs typeface="+mn-cs"/>
-              </a:defRPr>
-            </a:lvl1pPr>
-            <a:lvl2pPr marL="457200" indent="0" algn="ctr" defTabSz="914400" rtl="0" eaLnBrk="1" latinLnBrk="0" hangingPunct="1">
-              <a:lnSpc>
-                <a:spcPct val="90000"/>
-              </a:lnSpc>
-              <a:spcBef>
-                <a:spcPts val="500"/>
-              </a:spcBef>
-              <a:buFont typeface="Arial" panose="020B0604020202020204" pitchFamily="34" charset="0"/>
-              <a:buNone/>
-              <a:defRPr sz="2000" kern="1200">
-                <a:solidFill>
-                  <a:schemeClr val="tx1"/>
-                </a:solidFill>
-                <a:latin typeface="+mn-lt"/>
-                <a:ea typeface="+mn-ea"/>
-                <a:cs typeface="+mn-cs"/>
-              </a:defRPr>
-            </a:lvl2pPr>
-            <a:lvl3pPr marL="914400" indent="0" algn="ctr" defTabSz="914400" rtl="0" eaLnBrk="1" latinLnBrk="0" hangingPunct="1">
-              <a:lnSpc>
-                <a:spcPct val="90000"/>
-              </a:lnSpc>
-              <a:spcBef>
-                <a:spcPts val="500"/>
-              </a:spcBef>
-              <a:buFont typeface="Arial" panose="020B0604020202020204" pitchFamily="34" charset="0"/>
-              <a:buNone/>
-              <a:defRPr sz="1800" kern="1200">
-                <a:solidFill>
-                  <a:schemeClr val="tx1"/>
-                </a:solidFill>
-                <a:latin typeface="+mn-lt"/>
-                <a:ea typeface="+mn-ea"/>
-                <a:cs typeface="+mn-cs"/>
-              </a:defRPr>
-            </a:lvl3pPr>
-            <a:lvl4pPr marL="1371600" indent="0" algn="ctr" defTabSz="914400" rtl="0" eaLnBrk="1" latinLnBrk="0" hangingPunct="1">
-              <a:lnSpc>
-                <a:spcPct val="90000"/>
-              </a:lnSpc>
-              <a:spcBef>
-                <a:spcPts val="500"/>
-              </a:spcBef>
-              <a:buFont typeface="Arial" panose="020B0604020202020204" pitchFamily="34" charset="0"/>
-              <a:buNone/>
-              <a:defRPr sz="1600" kern="1200">
-                <a:solidFill>
-                  <a:schemeClr val="tx1"/>
-                </a:solidFill>
-                <a:latin typeface="+mn-lt"/>
-                <a:ea typeface="+mn-ea"/>
-                <a:cs typeface="+mn-cs"/>
-              </a:defRPr>
-            </a:lvl4pPr>
-            <a:lvl5pPr marL="1828800" indent="0" algn="ctr" defTabSz="914400" rtl="0" eaLnBrk="1" latinLnBrk="0" hangingPunct="1">
-              <a:lnSpc>
-                <a:spcPct val="90000"/>
-              </a:lnSpc>
-              <a:spcBef>
-                <a:spcPts val="500"/>
-              </a:spcBef>
-              <a:buFont typeface="Arial" panose="020B0604020202020204" pitchFamily="34" charset="0"/>
-              <a:buNone/>
-              <a:defRPr sz="1600" kern="1200">
-                <a:solidFill>
-                  <a:schemeClr val="tx1"/>
-                </a:solidFill>
-                <a:latin typeface="+mn-lt"/>
-                <a:ea typeface="+mn-ea"/>
-                <a:cs typeface="+mn-cs"/>
-              </a:defRPr>
-            </a:lvl5pPr>
-            <a:lvl6pPr marL="2286000" indent="0" algn="ctr" defTabSz="914400" rtl="0" eaLnBrk="1" latinLnBrk="0" hangingPunct="1">
-              <a:lnSpc>
-                <a:spcPct val="90000"/>
-              </a:lnSpc>
-              <a:spcBef>
-                <a:spcPts val="500"/>
-              </a:spcBef>
-              <a:buFont typeface="Arial" panose="020B0604020202020204" pitchFamily="34" charset="0"/>
-              <a:buNone/>
-              <a:defRPr sz="1600" kern="1200">
-                <a:solidFill>
-                  <a:schemeClr val="tx1"/>
-                </a:solidFill>
-                <a:latin typeface="+mn-lt"/>
-                <a:ea typeface="+mn-ea"/>
-                <a:cs typeface="+mn-cs"/>
-              </a:defRPr>
-            </a:lvl6pPr>
-            <a:lvl7pPr marL="2743200" indent="0" algn="ctr" defTabSz="914400" rtl="0" eaLnBrk="1" latinLnBrk="0" hangingPunct="1">
-              <a:lnSpc>
-                <a:spcPct val="90000"/>
-              </a:lnSpc>
-              <a:spcBef>
-                <a:spcPts val="500"/>
-              </a:spcBef>
-              <a:buFont typeface="Arial" panose="020B0604020202020204" pitchFamily="34" charset="0"/>
-              <a:buNone/>
-              <a:defRPr sz="1600" kern="1200">
-                <a:solidFill>
-                  <a:schemeClr val="tx1"/>
-                </a:solidFill>
-                <a:latin typeface="+mn-lt"/>
-                <a:ea typeface="+mn-ea"/>
-                <a:cs typeface="+mn-cs"/>
-              </a:defRPr>
-            </a:lvl7pPr>
-            <a:lvl8pPr marL="3200400" indent="0" algn="ctr" defTabSz="914400" rtl="0" eaLnBrk="1" latinLnBrk="0" hangingPunct="1">
-              <a:lnSpc>
-                <a:spcPct val="90000"/>
-              </a:lnSpc>
-              <a:spcBef>
-                <a:spcPts val="500"/>
-              </a:spcBef>
-              <a:buFont typeface="Arial" panose="020B0604020202020204" pitchFamily="34" charset="0"/>
-              <a:buNone/>
-              <a:defRPr sz="1600" kern="1200">
-                <a:solidFill>
-                  <a:schemeClr val="tx1"/>
-                </a:solidFill>
-                <a:latin typeface="+mn-lt"/>
-                <a:ea typeface="+mn-ea"/>
-                <a:cs typeface="+mn-cs"/>
-              </a:defRPr>
-            </a:lvl8pPr>
-            <a:lvl9pPr marL="3657600" indent="0" algn="ctr" defTabSz="914400" rtl="0" eaLnBrk="1" latinLnBrk="0" hangingPunct="1">
-              <a:lnSpc>
-                <a:spcPct val="90000"/>
-              </a:lnSpc>
-              <a:spcBef>
-                <a:spcPts val="500"/>
-              </a:spcBef>
-              <a:buFont typeface="Arial" panose="020B0604020202020204" pitchFamily="34" charset="0"/>
-              <a:buNone/>
-              <a:defRPr sz="1600" kern="1200">
-                <a:solidFill>
-                  <a:schemeClr val="tx1"/>
-                </a:solidFill>
-                <a:latin typeface="+mn-lt"/>
-                <a:ea typeface="+mn-ea"/>
-                <a:cs typeface="+mn-cs"/>
-              </a:defRPr>
-            </a:lvl9pPr>
-          </a:lstStyle>
-          <a:p>
-            <a:pPr>
-              <a:buFont typeface="Wingdings" panose="05000000000000000000" pitchFamily="2" charset="2"/>
-              <a:buChar char="§"/>
-            </a:pPr>
-            <a:endParaRPr lang="en-PH" dirty="0">
-              <a:solidFill>
-                <a:schemeClr val="bg1"/>
-              </a:solidFill>
-              <a:latin typeface="Aptos (Body)"/>
-            </a:endParaRPr>
-          </a:p>
-        </p:txBody>
-      </p:sp>
-      <p:sp>
-        <p:nvSpPr>
-          <p:cNvPr id="8" name="TextBox 7">
-            <a:extLst>
-              <a:ext uri="{FF2B5EF4-FFF2-40B4-BE49-F238E27FC236}">
-                <a16:creationId xmlns:a16="http://schemas.microsoft.com/office/drawing/2014/main" id="{91ED0E3C-FDD2-C790-987B-2C0EB5D427C3}"/>
-              </a:ext>
-            </a:extLst>
-          </p:cNvPr>
-          <p:cNvSpPr txBox="1"/>
-          <p:nvPr/>
-        </p:nvSpPr>
-        <p:spPr>
-          <a:xfrm>
-            <a:off x="870769" y="2269144"/>
-            <a:ext cx="10842863" cy="2755178"/>
-          </a:xfrm>
-          <a:prstGeom prst="rect">
-            <a:avLst/>
-          </a:prstGeom>
-          <a:noFill/>
-        </p:spPr>
-        <p:txBody>
-          <a:bodyPr wrap="square">
-            <a:spAutoFit/>
-          </a:bodyPr>
-          <a:lstStyle/>
-          <a:p>
-            <a:pPr>
-              <a:buNone/>
-            </a:pPr>
-            <a:r>
-              <a:rPr lang="en-US" sz="2000" b="0" dirty="0">
-                <a:solidFill>
-                  <a:srgbClr val="569CD6"/>
-                </a:solidFill>
-                <a:effectLst/>
-                <a:latin typeface="Consolas" panose="020B0609020204030204" pitchFamily="49" charset="0"/>
-              </a:rPr>
-              <a:t>public</a:t>
-            </a:r>
-            <a:r>
-              <a:rPr lang="en-US" sz="2000" b="0" dirty="0">
-                <a:solidFill>
-                  <a:srgbClr val="CCCCCC"/>
-                </a:solidFill>
-                <a:effectLst/>
-                <a:latin typeface="Consolas" panose="020B0609020204030204" pitchFamily="49" charset="0"/>
-              </a:rPr>
-              <a:t> </a:t>
-            </a:r>
-            <a:r>
-              <a:rPr lang="en-US" sz="2000" b="0" dirty="0">
-                <a:solidFill>
-                  <a:srgbClr val="569CD6"/>
-                </a:solidFill>
-                <a:effectLst/>
-                <a:latin typeface="Consolas" panose="020B0609020204030204" pitchFamily="49" charset="0"/>
-              </a:rPr>
-              <a:t>class</a:t>
-            </a:r>
-            <a:r>
-              <a:rPr lang="en-US" sz="2000" b="0" dirty="0">
-                <a:solidFill>
-                  <a:srgbClr val="CCCCCC"/>
-                </a:solidFill>
-                <a:effectLst/>
-                <a:latin typeface="Consolas" panose="020B0609020204030204" pitchFamily="49" charset="0"/>
-              </a:rPr>
-              <a:t> </a:t>
-            </a:r>
-            <a:r>
-              <a:rPr lang="en-US" sz="2000" b="0" dirty="0" err="1">
-                <a:solidFill>
-                  <a:srgbClr val="4EC9B0"/>
-                </a:solidFill>
-                <a:effectLst/>
-                <a:latin typeface="Consolas" panose="020B0609020204030204" pitchFamily="49" charset="0"/>
-              </a:rPr>
-              <a:t>MyThread</a:t>
-            </a:r>
-            <a:r>
-              <a:rPr lang="en-US" sz="2000" b="0" dirty="0">
-                <a:solidFill>
-                  <a:srgbClr val="CCCCCC"/>
-                </a:solidFill>
-                <a:effectLst/>
-                <a:latin typeface="Consolas" panose="020B0609020204030204" pitchFamily="49" charset="0"/>
-              </a:rPr>
-              <a:t> </a:t>
-            </a:r>
-            <a:r>
-              <a:rPr lang="en-US" sz="2000" b="0" dirty="0">
-                <a:solidFill>
-                  <a:srgbClr val="569CD6"/>
-                </a:solidFill>
-                <a:effectLst/>
-                <a:latin typeface="Consolas" panose="020B0609020204030204" pitchFamily="49" charset="0"/>
-              </a:rPr>
-              <a:t>extends</a:t>
-            </a:r>
-            <a:r>
-              <a:rPr lang="en-US" sz="2000" b="0" dirty="0">
-                <a:solidFill>
-                  <a:srgbClr val="CCCCCC"/>
-                </a:solidFill>
-                <a:effectLst/>
-                <a:latin typeface="Consolas" panose="020B0609020204030204" pitchFamily="49" charset="0"/>
-              </a:rPr>
-              <a:t> </a:t>
-            </a:r>
-            <a:r>
-              <a:rPr lang="en-US" sz="2000" b="0" dirty="0">
-                <a:solidFill>
-                  <a:srgbClr val="4EC9B0"/>
-                </a:solidFill>
-                <a:effectLst/>
-                <a:latin typeface="Consolas" panose="020B0609020204030204" pitchFamily="49" charset="0"/>
-              </a:rPr>
-              <a:t>Thread</a:t>
-            </a:r>
-            <a:r>
-              <a:rPr lang="en-US" sz="2000" b="0" dirty="0">
-                <a:solidFill>
-                  <a:srgbClr val="CCCCCC"/>
-                </a:solidFill>
-                <a:effectLst/>
-                <a:latin typeface="Consolas" panose="020B0609020204030204" pitchFamily="49" charset="0"/>
-              </a:rPr>
-              <a:t>{</a:t>
-            </a:r>
-          </a:p>
-          <a:p>
-            <a:pPr>
-              <a:buNone/>
-            </a:pPr>
-            <a:br>
-              <a:rPr lang="en-US" sz="2000" b="0" dirty="0">
-                <a:solidFill>
-                  <a:srgbClr val="CCCCCC"/>
-                </a:solidFill>
-                <a:effectLst/>
-                <a:latin typeface="Consolas" panose="020B0609020204030204" pitchFamily="49" charset="0"/>
-              </a:rPr>
-            </a:br>
-            <a:r>
-              <a:rPr lang="en-US" sz="2000" b="0" dirty="0">
-                <a:solidFill>
-                  <a:srgbClr val="CCCCCC"/>
-                </a:solidFill>
-                <a:effectLst/>
-                <a:latin typeface="Consolas" panose="020B0609020204030204" pitchFamily="49" charset="0"/>
-              </a:rPr>
-              <a:t>    @</a:t>
-            </a:r>
-            <a:r>
-              <a:rPr lang="en-US" sz="2000" b="0" dirty="0">
-                <a:solidFill>
-                  <a:srgbClr val="4EC9B0"/>
-                </a:solidFill>
-                <a:effectLst/>
-                <a:latin typeface="Consolas" panose="020B0609020204030204" pitchFamily="49" charset="0"/>
-              </a:rPr>
-              <a:t>Override</a:t>
-            </a:r>
-            <a:endParaRPr lang="en-US" sz="2000" b="0" dirty="0">
-              <a:solidFill>
-                <a:srgbClr val="CCCCCC"/>
-              </a:solidFill>
-              <a:effectLst/>
-              <a:latin typeface="Consolas" panose="020B0609020204030204" pitchFamily="49" charset="0"/>
-            </a:endParaRPr>
-          </a:p>
-          <a:p>
-            <a:pPr>
-              <a:buNone/>
-            </a:pPr>
-            <a:r>
-              <a:rPr lang="en-US" sz="2000" b="0" dirty="0">
-                <a:solidFill>
-                  <a:srgbClr val="CCCCCC"/>
-                </a:solidFill>
-                <a:effectLst/>
-                <a:latin typeface="Consolas" panose="020B0609020204030204" pitchFamily="49" charset="0"/>
-              </a:rPr>
-              <a:t>    </a:t>
-            </a:r>
-            <a:r>
-              <a:rPr lang="en-US" sz="2000" b="0" dirty="0">
-                <a:solidFill>
-                  <a:srgbClr val="569CD6"/>
-                </a:solidFill>
-                <a:effectLst/>
-                <a:latin typeface="Consolas" panose="020B0609020204030204" pitchFamily="49" charset="0"/>
-              </a:rPr>
-              <a:t>public</a:t>
-            </a:r>
-            <a:r>
-              <a:rPr lang="en-US" sz="2000" b="0" dirty="0">
-                <a:solidFill>
-                  <a:srgbClr val="CCCCCC"/>
-                </a:solidFill>
-                <a:effectLst/>
-                <a:latin typeface="Consolas" panose="020B0609020204030204" pitchFamily="49" charset="0"/>
-              </a:rPr>
-              <a:t> </a:t>
-            </a:r>
-            <a:r>
-              <a:rPr lang="en-US" sz="2000" b="0" dirty="0">
-                <a:solidFill>
-                  <a:srgbClr val="4EC9B0"/>
-                </a:solidFill>
-                <a:effectLst/>
-                <a:latin typeface="Consolas" panose="020B0609020204030204" pitchFamily="49" charset="0"/>
-              </a:rPr>
-              <a:t>void</a:t>
-            </a:r>
-            <a:r>
-              <a:rPr lang="en-US" sz="2000" b="0" dirty="0">
-                <a:solidFill>
-                  <a:srgbClr val="CCCCCC"/>
-                </a:solidFill>
-                <a:effectLst/>
-                <a:latin typeface="Consolas" panose="020B0609020204030204" pitchFamily="49" charset="0"/>
-              </a:rPr>
-              <a:t> </a:t>
-            </a:r>
-            <a:r>
-              <a:rPr lang="en-US" sz="2000" b="0" dirty="0">
-                <a:solidFill>
-                  <a:srgbClr val="DCDCAA"/>
-                </a:solidFill>
-                <a:effectLst/>
-                <a:latin typeface="Consolas" panose="020B0609020204030204" pitchFamily="49" charset="0"/>
-              </a:rPr>
-              <a:t>run</a:t>
-            </a:r>
-            <a:r>
-              <a:rPr lang="en-US" sz="2000" b="0" dirty="0">
-                <a:solidFill>
-                  <a:srgbClr val="CCCCCC"/>
-                </a:solidFill>
-                <a:effectLst/>
-                <a:latin typeface="Consolas" panose="020B0609020204030204" pitchFamily="49" charset="0"/>
-              </a:rPr>
-              <a:t>() {</a:t>
-            </a:r>
-          </a:p>
-          <a:p>
-            <a:pPr>
-              <a:buNone/>
-            </a:pPr>
-            <a:r>
-              <a:rPr lang="en-US" sz="2000" b="0" dirty="0">
-                <a:solidFill>
-                  <a:srgbClr val="CCCCCC"/>
-                </a:solidFill>
-                <a:effectLst/>
-                <a:latin typeface="Consolas" panose="020B0609020204030204" pitchFamily="49" charset="0"/>
-              </a:rPr>
-              <a:t>    </a:t>
-            </a:r>
-          </a:p>
-          <a:p>
-            <a:pPr>
-              <a:buNone/>
-            </a:pPr>
-            <a:r>
-              <a:rPr lang="en-US" sz="2000" b="0" dirty="0">
-                <a:solidFill>
-                  <a:srgbClr val="CCCCCC"/>
-                </a:solidFill>
-                <a:effectLst/>
-                <a:latin typeface="Consolas" panose="020B0609020204030204" pitchFamily="49" charset="0"/>
-              </a:rPr>
-              <a:t>        </a:t>
-            </a:r>
-            <a:r>
-              <a:rPr lang="en-US" sz="2000" b="0" dirty="0" err="1">
-                <a:solidFill>
-                  <a:srgbClr val="4EC9B0"/>
-                </a:solidFill>
-                <a:effectLst/>
-                <a:latin typeface="Consolas" panose="020B0609020204030204" pitchFamily="49" charset="0"/>
-              </a:rPr>
-              <a:t>System</a:t>
-            </a:r>
-            <a:r>
-              <a:rPr lang="en-US" sz="2000" b="0" dirty="0" err="1">
-                <a:solidFill>
-                  <a:srgbClr val="CCCCCC"/>
-                </a:solidFill>
-                <a:effectLst/>
-                <a:latin typeface="Consolas" panose="020B0609020204030204" pitchFamily="49" charset="0"/>
-              </a:rPr>
-              <a:t>.</a:t>
-            </a:r>
-            <a:r>
-              <a:rPr lang="en-US" sz="2000" b="0" dirty="0" err="1">
-                <a:solidFill>
-                  <a:srgbClr val="9CDCFE"/>
-                </a:solidFill>
-                <a:effectLst/>
-                <a:latin typeface="Consolas" panose="020B0609020204030204" pitchFamily="49" charset="0"/>
-              </a:rPr>
-              <a:t>out</a:t>
-            </a:r>
-            <a:r>
-              <a:rPr lang="en-US" sz="2000" b="0" dirty="0" err="1">
-                <a:solidFill>
-                  <a:srgbClr val="CCCCCC"/>
-                </a:solidFill>
-                <a:effectLst/>
-                <a:latin typeface="Consolas" panose="020B0609020204030204" pitchFamily="49" charset="0"/>
-              </a:rPr>
-              <a:t>.</a:t>
-            </a:r>
-            <a:r>
-              <a:rPr lang="en-US" sz="2000" b="0" dirty="0" err="1">
-                <a:solidFill>
-                  <a:srgbClr val="DCDCAA"/>
-                </a:solidFill>
-                <a:effectLst/>
-                <a:latin typeface="Consolas" panose="020B0609020204030204" pitchFamily="49" charset="0"/>
-              </a:rPr>
-              <a:t>println</a:t>
-            </a:r>
-            <a:r>
-              <a:rPr lang="en-US" sz="2000" b="0" dirty="0">
-                <a:solidFill>
-                  <a:srgbClr val="CCCCCC"/>
-                </a:solidFill>
-                <a:effectLst/>
-                <a:latin typeface="Consolas" panose="020B0609020204030204" pitchFamily="49" charset="0"/>
-              </a:rPr>
-              <a:t>(</a:t>
-            </a:r>
-            <a:r>
-              <a:rPr lang="en-US" sz="2000" b="0" dirty="0">
-                <a:solidFill>
-                  <a:srgbClr val="CE9178"/>
-                </a:solidFill>
-                <a:effectLst/>
-                <a:latin typeface="Consolas" panose="020B0609020204030204" pitchFamily="49" charset="0"/>
-              </a:rPr>
-              <a:t>"This is a user thread that is running"</a:t>
-            </a:r>
-            <a:r>
-              <a:rPr lang="en-US" sz="2000" b="0" dirty="0">
-                <a:solidFill>
-                  <a:srgbClr val="CCCCCC"/>
-                </a:solidFill>
-                <a:effectLst/>
-                <a:latin typeface="Consolas" panose="020B0609020204030204" pitchFamily="49" charset="0"/>
-              </a:rPr>
-              <a:t>);</a:t>
-            </a:r>
-          </a:p>
-          <a:p>
-            <a:pPr>
-              <a:buNone/>
-            </a:pPr>
-            <a:r>
-              <a:rPr lang="en-US" sz="2000" b="0" dirty="0">
-                <a:solidFill>
-                  <a:srgbClr val="CCCCCC"/>
-                </a:solidFill>
-                <a:effectLst/>
-                <a:latin typeface="Consolas" panose="020B0609020204030204" pitchFamily="49" charset="0"/>
-              </a:rPr>
-              <a:t>    }</a:t>
-            </a:r>
-          </a:p>
-          <a:p>
-            <a:r>
-              <a:rPr lang="en-US" sz="2000" b="0" dirty="0">
-                <a:solidFill>
-                  <a:srgbClr val="CCCCCC"/>
-                </a:solidFill>
-                <a:effectLst/>
-                <a:latin typeface="Consolas" panose="020B0609020204030204" pitchFamily="49" charset="0"/>
-              </a:rPr>
-              <a:t>}</a:t>
-            </a:r>
-          </a:p>
-          <a:p>
-            <a:pPr>
-              <a:lnSpc>
-                <a:spcPts val="1425"/>
-              </a:lnSpc>
-            </a:pPr>
-            <a:endParaRPr lang="en-PH" sz="2000" b="0" dirty="0">
-              <a:solidFill>
-                <a:srgbClr val="CCCCCC"/>
-              </a:solidFill>
-              <a:effectLst/>
-              <a:latin typeface="Consolas" panose="020B0609020204030204" pitchFamily="49" charset="0"/>
-            </a:endParaRPr>
-          </a:p>
-        </p:txBody>
-      </p:sp>
-      <p:sp>
-        <p:nvSpPr>
-          <p:cNvPr id="9" name="TextBox 8">
-            <a:extLst>
-              <a:ext uri="{FF2B5EF4-FFF2-40B4-BE49-F238E27FC236}">
-                <a16:creationId xmlns:a16="http://schemas.microsoft.com/office/drawing/2014/main" id="{E553F55F-6FB1-ECB9-6572-D326B1E0587E}"/>
-              </a:ext>
-            </a:extLst>
-          </p:cNvPr>
-          <p:cNvSpPr txBox="1"/>
-          <p:nvPr/>
-        </p:nvSpPr>
-        <p:spPr>
-          <a:xfrm>
-            <a:off x="606114" y="5334077"/>
-            <a:ext cx="11235265" cy="1015663"/>
-          </a:xfrm>
-          <a:prstGeom prst="rect">
-            <a:avLst/>
-          </a:prstGeom>
-          <a:noFill/>
-        </p:spPr>
-        <p:txBody>
-          <a:bodyPr wrap="square">
-            <a:spAutoFit/>
-          </a:bodyPr>
-          <a:lstStyle/>
-          <a:p>
-            <a:pPr marL="0" indent="0" algn="ctr">
-              <a:buNone/>
-            </a:pPr>
-            <a:r>
-              <a:rPr lang="en-US" sz="3000" dirty="0"/>
-              <a:t>There are two ways to create a thread. The first option is to </a:t>
-            </a:r>
-            <a:r>
-              <a:rPr lang="en-US" sz="3000" dirty="0">
-                <a:solidFill>
-                  <a:srgbClr val="0070C0"/>
-                </a:solidFill>
-              </a:rPr>
-              <a:t>extend the </a:t>
-            </a:r>
-            <a:r>
-              <a:rPr lang="en-US" sz="3000" b="1" dirty="0">
-                <a:solidFill>
-                  <a:srgbClr val="0070C0"/>
-                </a:solidFill>
-              </a:rPr>
-              <a:t>Thread</a:t>
-            </a:r>
-            <a:r>
-              <a:rPr lang="en-US" sz="3000" dirty="0">
-                <a:solidFill>
-                  <a:srgbClr val="0070C0"/>
-                </a:solidFill>
-              </a:rPr>
-              <a:t> </a:t>
-            </a:r>
-            <a:r>
-              <a:rPr lang="en-US" sz="3000" b="1" dirty="0">
-                <a:solidFill>
-                  <a:srgbClr val="0070C0"/>
-                </a:solidFill>
-              </a:rPr>
-              <a:t>class.</a:t>
-            </a:r>
-          </a:p>
-        </p:txBody>
-      </p:sp>
-      <p:grpSp>
-        <p:nvGrpSpPr>
-          <p:cNvPr id="16" name="Group 15">
-            <a:extLst>
-              <a:ext uri="{FF2B5EF4-FFF2-40B4-BE49-F238E27FC236}">
-                <a16:creationId xmlns:a16="http://schemas.microsoft.com/office/drawing/2014/main" id="{0B5904F4-9A26-8DD6-B6AE-427DDFDDA05E}"/>
-              </a:ext>
-            </a:extLst>
-          </p:cNvPr>
-          <p:cNvGrpSpPr/>
-          <p:nvPr/>
-        </p:nvGrpSpPr>
-        <p:grpSpPr>
-          <a:xfrm>
-            <a:off x="9743867" y="2058395"/>
-            <a:ext cx="1988587" cy="369332"/>
-            <a:chOff x="9913262" y="1679539"/>
-            <a:chExt cx="1988587" cy="369332"/>
-          </a:xfrm>
-        </p:grpSpPr>
-        <p:pic>
-          <p:nvPicPr>
-            <p:cNvPr id="17" name="Picture 16" descr="A paper with a logo on it&#10;&#10;AI-generated content may be incorrect.">
-              <a:extLst>
-                <a:ext uri="{FF2B5EF4-FFF2-40B4-BE49-F238E27FC236}">
-                  <a16:creationId xmlns:a16="http://schemas.microsoft.com/office/drawing/2014/main" id="{4986DE55-89DF-772F-9ED8-B72954311785}"/>
-                </a:ext>
-              </a:extLst>
-            </p:cNvPr>
-            <p:cNvPicPr>
-              <a:picLocks noChangeAspect="1"/>
-            </p:cNvPicPr>
-            <p:nvPr/>
-          </p:nvPicPr>
-          <p:blipFill>
-            <a:blip r:embed="rId2"/>
-            <a:stretch>
-              <a:fillRect/>
-            </a:stretch>
-          </p:blipFill>
-          <p:spPr>
-            <a:xfrm>
-              <a:off x="9913262" y="1679539"/>
-              <a:ext cx="360000" cy="360000"/>
-            </a:xfrm>
-            <a:prstGeom prst="rect">
-              <a:avLst/>
-            </a:prstGeom>
-          </p:spPr>
-        </p:pic>
-        <p:sp>
-          <p:nvSpPr>
-            <p:cNvPr id="18" name="TextBox 17">
-              <a:extLst>
-                <a:ext uri="{FF2B5EF4-FFF2-40B4-BE49-F238E27FC236}">
-                  <a16:creationId xmlns:a16="http://schemas.microsoft.com/office/drawing/2014/main" id="{56EA2C0C-19D5-250C-A203-14049C72A18E}"/>
-                </a:ext>
-              </a:extLst>
-            </p:cNvPr>
-            <p:cNvSpPr txBox="1"/>
-            <p:nvPr/>
-          </p:nvSpPr>
-          <p:spPr>
-            <a:xfrm>
-              <a:off x="10273262" y="1679539"/>
-              <a:ext cx="1628587" cy="369332"/>
-            </a:xfrm>
-            <a:prstGeom prst="rect">
-              <a:avLst/>
-            </a:prstGeom>
-            <a:noFill/>
-          </p:spPr>
-          <p:txBody>
-            <a:bodyPr wrap="none" rtlCol="0">
-              <a:spAutoFit/>
-            </a:bodyPr>
-            <a:lstStyle/>
-            <a:p>
-              <a:r>
-                <a:rPr lang="en-PH" dirty="0">
-                  <a:solidFill>
-                    <a:schemeClr val="bg1"/>
-                  </a:solidFill>
-                </a:rPr>
-                <a:t>MyThread.java</a:t>
-              </a:r>
-            </a:p>
-          </p:txBody>
-        </p:sp>
-      </p:grpSp>
-      <p:sp>
-        <p:nvSpPr>
-          <p:cNvPr id="19" name="Rectangle 18">
-            <a:extLst>
-              <a:ext uri="{FF2B5EF4-FFF2-40B4-BE49-F238E27FC236}">
-                <a16:creationId xmlns:a16="http://schemas.microsoft.com/office/drawing/2014/main" id="{7FC83DEE-0689-4CE5-ADD7-AC5F8CC1FC15}"/>
-              </a:ext>
-            </a:extLst>
-          </p:cNvPr>
-          <p:cNvSpPr/>
-          <p:nvPr/>
-        </p:nvSpPr>
-        <p:spPr>
-          <a:xfrm>
-            <a:off x="4034060" y="2292565"/>
-            <a:ext cx="1976775" cy="369332"/>
-          </a:xfrm>
-          <a:prstGeom prst="rect">
-            <a:avLst/>
-          </a:prstGeom>
-          <a:noFill/>
-          <a:ln w="38100">
-            <a:solidFill>
-              <a:srgbClr val="00B050"/>
-            </a:solidFill>
-          </a:ln>
-        </p:spPr>
-        <p:style>
-          <a:lnRef idx="2">
-            <a:schemeClr val="accent1">
-              <a:shade val="15000"/>
-            </a:schemeClr>
-          </a:lnRef>
-          <a:fillRef idx="1">
-            <a:schemeClr val="accent1"/>
-          </a:fillRef>
-          <a:effectRef idx="0">
-            <a:schemeClr val="accent1"/>
-          </a:effectRef>
-          <a:fontRef idx="minor">
-            <a:schemeClr val="lt1"/>
-          </a:fontRef>
-        </p:style>
-        <p:txBody>
-          <a:bodyPr rtlCol="0" anchor="ctr"/>
-          <a:lstStyle/>
-          <a:p>
-            <a:pPr algn="ctr"/>
-            <a:endParaRPr lang="en-PH"/>
-          </a:p>
-        </p:txBody>
-      </p:sp>
-      <p:sp>
-        <p:nvSpPr>
-          <p:cNvPr id="21" name="Arrow: Left 20">
-            <a:extLst>
-              <a:ext uri="{FF2B5EF4-FFF2-40B4-BE49-F238E27FC236}">
-                <a16:creationId xmlns:a16="http://schemas.microsoft.com/office/drawing/2014/main" id="{197C6AEB-FA34-110C-A17A-899EAF20D467}"/>
-              </a:ext>
-            </a:extLst>
-          </p:cNvPr>
-          <p:cNvSpPr/>
-          <p:nvPr/>
-        </p:nvSpPr>
-        <p:spPr>
-          <a:xfrm>
-            <a:off x="6223746" y="2234915"/>
-            <a:ext cx="1029724" cy="484632"/>
-          </a:xfrm>
-          <a:prstGeom prst="leftArrow">
-            <a:avLst/>
-          </a:prstGeom>
-          <a:solidFill>
-            <a:srgbClr val="00B050"/>
-          </a:solidFill>
-          <a:ln>
-            <a:solidFill>
-              <a:srgbClr val="00B050"/>
-            </a:solidFill>
-          </a:ln>
-        </p:spPr>
-        <p:style>
-          <a:lnRef idx="2">
-            <a:schemeClr val="accent1">
-              <a:shade val="15000"/>
-            </a:schemeClr>
-          </a:lnRef>
-          <a:fillRef idx="1">
-            <a:schemeClr val="accent1"/>
-          </a:fillRef>
-          <a:effectRef idx="0">
-            <a:schemeClr val="accent1"/>
-          </a:effectRef>
-          <a:fontRef idx="minor">
-            <a:schemeClr val="lt1"/>
-          </a:fontRef>
-        </p:style>
-        <p:txBody>
-          <a:bodyPr rtlCol="0" anchor="ctr"/>
-          <a:lstStyle/>
-          <a:p>
-            <a:pPr algn="ctr"/>
-            <a:endParaRPr lang="en-PH"/>
-          </a:p>
-        </p:txBody>
-      </p:sp>
-    </p:spTree>
-    <p:extLst>
-      <p:ext uri="{BB962C8B-B14F-4D97-AF65-F5344CB8AC3E}">
-        <p14:creationId xmlns:p14="http://schemas.microsoft.com/office/powerpoint/2010/main" val="3323187310"/>
-      </p:ext>
-    </p:extLst>
-  </p:cSld>
-  <p:clrMapOvr>
-    <a:masterClrMapping/>
-  </p:clrMapOvr>
-  <p:timing>
-    <p:tnLst>
-      <p:par>
-        <p:cTn id="1" dur="indefinite" restart="never" nodeType="tmRoot">
-          <p:childTnLst>
-            <p:seq concurrent="1" nextAc="seek">
-              <p:cTn id="2" dur="indefinite" nodeType="mainSeq">
-                <p:childTnLst>
-                  <p:par>
-                    <p:cTn id="3" fill="hold">
-                      <p:stCondLst>
-                        <p:cond delay="indefinite"/>
-                      </p:stCondLst>
-                      <p:childTnLst>
-                        <p:par>
-                          <p:cTn id="4" fill="hold">
-                            <p:stCondLst>
-                              <p:cond delay="0"/>
-                            </p:stCondLst>
-                            <p:childTnLst>
-                              <p:par>
-                                <p:cTn id="5" presetID="10" presetClass="entr" presetSubtype="0" fill="hold" grpId="0" nodeType="clickEffect">
-                                  <p:stCondLst>
-                                    <p:cond delay="0"/>
-                                  </p:stCondLst>
-                                  <p:childTnLst>
-                                    <p:set>
-                                      <p:cBhvr>
-                                        <p:cTn id="6" dur="1" fill="hold">
-                                          <p:stCondLst>
-                                            <p:cond delay="0"/>
-                                          </p:stCondLst>
-                                        </p:cTn>
-                                        <p:tgtEl>
-                                          <p:spTgt spid="19"/>
-                                        </p:tgtEl>
-                                        <p:attrNameLst>
-                                          <p:attrName>style.visibility</p:attrName>
-                                        </p:attrNameLst>
-                                      </p:cBhvr>
-                                      <p:to>
-                                        <p:strVal val="visible"/>
-                                      </p:to>
-                                    </p:set>
-                                    <p:animEffect transition="in" filter="fade">
-                                      <p:cBhvr>
-                                        <p:cTn id="7" dur="500"/>
-                                        <p:tgtEl>
-                                          <p:spTgt spid="19"/>
-                                        </p:tgtEl>
-                                      </p:cBhvr>
-                                    </p:animEffect>
-                                  </p:childTnLst>
-                                </p:cTn>
-                              </p:par>
-                            </p:childTnLst>
-                          </p:cTn>
-                        </p:par>
-                      </p:childTnLst>
-                    </p:cTn>
-                  </p:par>
-                  <p:par>
-                    <p:cTn id="8" fill="hold">
-                      <p:stCondLst>
-                        <p:cond delay="indefinite"/>
-                      </p:stCondLst>
-                      <p:childTnLst>
-                        <p:par>
-                          <p:cTn id="9" fill="hold">
-                            <p:stCondLst>
-                              <p:cond delay="0"/>
-                            </p:stCondLst>
-                            <p:childTnLst>
-                              <p:par>
-                                <p:cTn id="10" presetID="10" presetClass="entr" presetSubtype="0" fill="hold" grpId="0" nodeType="clickEffect">
-                                  <p:stCondLst>
-                                    <p:cond delay="0"/>
-                                  </p:stCondLst>
-                                  <p:childTnLst>
-                                    <p:set>
-                                      <p:cBhvr>
-                                        <p:cTn id="11" dur="1" fill="hold">
-                                          <p:stCondLst>
-                                            <p:cond delay="0"/>
-                                          </p:stCondLst>
-                                        </p:cTn>
-                                        <p:tgtEl>
-                                          <p:spTgt spid="21"/>
-                                        </p:tgtEl>
-                                        <p:attrNameLst>
-                                          <p:attrName>style.visibility</p:attrName>
-                                        </p:attrNameLst>
-                                      </p:cBhvr>
-                                      <p:to>
-                                        <p:strVal val="visible"/>
-                                      </p:to>
-                                    </p:set>
-                                    <p:animEffect transition="in" filter="fade">
-                                      <p:cBhvr>
-                                        <p:cTn id="12" dur="500"/>
-                                        <p:tgtEl>
-                                          <p:spTgt spid="21"/>
-                                        </p:tgtEl>
-                                      </p:cBhvr>
-                                    </p:animEffect>
-                                  </p:childTnLst>
-                                </p:cTn>
-                              </p:par>
-                            </p:childTnLst>
-                          </p:cTn>
-                        </p:par>
-                      </p:childTnLst>
-                    </p:cTn>
-                  </p:par>
-                </p:childTnLst>
-              </p:cTn>
-              <p:prevCondLst>
-                <p:cond evt="onPrev" delay="0">
-                  <p:tgtEl>
-                    <p:sldTgt/>
-                  </p:tgtEl>
-                </p:cond>
-              </p:prevCondLst>
-              <p:nextCondLst>
-                <p:cond evt="onNext" delay="0">
-                  <p:tgtEl>
-                    <p:sldTgt/>
-                  </p:tgtEl>
-                </p:cond>
-              </p:nextCondLst>
-            </p:seq>
-          </p:childTnLst>
-        </p:cTn>
-      </p:par>
-    </p:tnLst>
-    <p:bldLst>
-      <p:bldP spid="19" grpId="0" animBg="1"/>
-      <p:bldP spid="21" grpId="0" animBg="1"/>
-    </p:bldLst>
-  </p:timing>
 </p:sld>
 </file>
 

</xml_diff>